<commit_message>
chore: description of level 2
</commit_message>
<xml_diff>
--- a/InternalDocumentation/Architecture.Pictures.pptx
+++ b/InternalDocumentation/Architecture.Pictures.pptx
@@ -4340,7 +4340,7 @@
         <p:spPr>
           <a:xfrm>
             <a:off x="781050" y="1504950"/>
-            <a:ext cx="7915275" cy="4448175"/>
+            <a:ext cx="8087646" cy="4448175"/>
           </a:xfrm>
           <a:prstGeom prst="rect">
             <a:avLst/>
@@ -4389,8 +4389,8 @@
         </p:nvSpPr>
         <p:spPr>
           <a:xfrm>
-            <a:off x="6848478" y="4339829"/>
-            <a:ext cx="1543051" cy="819150"/>
+            <a:off x="6667498" y="4339829"/>
+            <a:ext cx="2012816" cy="819150"/>
           </a:xfrm>
           <a:prstGeom prst="rect">
             <a:avLst/>
@@ -4419,7 +4419,7 @@
             <a:pPr algn="ctr"/>
             <a:r>
               <a:rPr lang="de-DE" dirty="0" err="1"/>
-              <a:t>Woopec.Core</a:t>
+              <a:t>Woopec.Graphics</a:t>
             </a:r>
             <a:endParaRPr lang="de-DE" dirty="0"/>
           </a:p>
@@ -4593,7 +4593,7 @@
         <p:spPr>
           <a:xfrm>
             <a:off x="4667248" y="2807879"/>
-            <a:ext cx="2952756" cy="1531950"/>
+            <a:ext cx="3006658" cy="1531950"/>
           </a:xfrm>
           <a:prstGeom prst="straightConnector1">
             <a:avLst/>
@@ -4769,7 +4769,7 @@
         <p:spPr>
           <a:xfrm flipH="1">
             <a:off x="5333998" y="4424941"/>
-            <a:ext cx="1514480" cy="5954"/>
+            <a:ext cx="1317489" cy="5954"/>
           </a:xfrm>
           <a:prstGeom prst="straightConnector1">
             <a:avLst/>
@@ -4811,7 +4811,7 @@
         </p:nvSpPr>
         <p:spPr>
           <a:xfrm>
-            <a:off x="5445224" y="3985452"/>
+            <a:off x="5445224" y="3965788"/>
             <a:ext cx="1292027" cy="523220"/>
           </a:xfrm>
           <a:prstGeom prst="rect">
@@ -5108,7 +5108,7 @@
         <p:spPr>
           <a:xfrm flipH="1">
             <a:off x="5368414" y="5009960"/>
-            <a:ext cx="1514480" cy="5954"/>
+            <a:ext cx="1283073" cy="5954"/>
           </a:xfrm>
           <a:prstGeom prst="straightConnector1">
             <a:avLst/>

</xml_diff>

<commit_message>
chore: current architecture of level 3
</commit_message>
<xml_diff>
--- a/InternalDocumentation/Architecture.Pictures.pptx
+++ b/InternalDocumentation/Architecture.Pictures.pptx
@@ -7,6 +7,10 @@
   <p:sldIdLst>
     <p:sldId id="256" r:id="rId2"/>
     <p:sldId id="257" r:id="rId3"/>
+    <p:sldId id="258" r:id="rId4"/>
+    <p:sldId id="259" r:id="rId5"/>
+    <p:sldId id="261" r:id="rId6"/>
+    <p:sldId id="260" r:id="rId7"/>
   </p:sldIdLst>
   <p:sldSz cx="12192000" cy="6858000"/>
   <p:notesSz cx="6858000" cy="9144000"/>
@@ -260,7 +264,7 @@
           <a:p>
             <a:fld id="{C4FF4887-CE9B-4F32-BB3E-621EACDFFFC6}" type="datetimeFigureOut">
               <a:rPr lang="de-DE" smtClean="0"/>
-              <a:t>05.07.2025</a:t>
+              <a:t>06.07.2025</a:t>
             </a:fld>
             <a:endParaRPr lang="de-DE"/>
           </a:p>
@@ -458,7 +462,7 @@
           <a:p>
             <a:fld id="{C4FF4887-CE9B-4F32-BB3E-621EACDFFFC6}" type="datetimeFigureOut">
               <a:rPr lang="de-DE" smtClean="0"/>
-              <a:t>05.07.2025</a:t>
+              <a:t>06.07.2025</a:t>
             </a:fld>
             <a:endParaRPr lang="de-DE"/>
           </a:p>
@@ -666,7 +670,7 @@
           <a:p>
             <a:fld id="{C4FF4887-CE9B-4F32-BB3E-621EACDFFFC6}" type="datetimeFigureOut">
               <a:rPr lang="de-DE" smtClean="0"/>
-              <a:t>05.07.2025</a:t>
+              <a:t>06.07.2025</a:t>
             </a:fld>
             <a:endParaRPr lang="de-DE"/>
           </a:p>
@@ -864,7 +868,7 @@
           <a:p>
             <a:fld id="{C4FF4887-CE9B-4F32-BB3E-621EACDFFFC6}" type="datetimeFigureOut">
               <a:rPr lang="de-DE" smtClean="0"/>
-              <a:t>05.07.2025</a:t>
+              <a:t>06.07.2025</a:t>
             </a:fld>
             <a:endParaRPr lang="de-DE"/>
           </a:p>
@@ -1139,7 +1143,7 @@
           <a:p>
             <a:fld id="{C4FF4887-CE9B-4F32-BB3E-621EACDFFFC6}" type="datetimeFigureOut">
               <a:rPr lang="de-DE" smtClean="0"/>
-              <a:t>05.07.2025</a:t>
+              <a:t>06.07.2025</a:t>
             </a:fld>
             <a:endParaRPr lang="de-DE"/>
           </a:p>
@@ -1404,7 +1408,7 @@
           <a:p>
             <a:fld id="{C4FF4887-CE9B-4F32-BB3E-621EACDFFFC6}" type="datetimeFigureOut">
               <a:rPr lang="de-DE" smtClean="0"/>
-              <a:t>05.07.2025</a:t>
+              <a:t>06.07.2025</a:t>
             </a:fld>
             <a:endParaRPr lang="de-DE"/>
           </a:p>
@@ -1816,7 +1820,7 @@
           <a:p>
             <a:fld id="{C4FF4887-CE9B-4F32-BB3E-621EACDFFFC6}" type="datetimeFigureOut">
               <a:rPr lang="de-DE" smtClean="0"/>
-              <a:t>05.07.2025</a:t>
+              <a:t>06.07.2025</a:t>
             </a:fld>
             <a:endParaRPr lang="de-DE"/>
           </a:p>
@@ -1957,7 +1961,7 @@
           <a:p>
             <a:fld id="{C4FF4887-CE9B-4F32-BB3E-621EACDFFFC6}" type="datetimeFigureOut">
               <a:rPr lang="de-DE" smtClean="0"/>
-              <a:t>05.07.2025</a:t>
+              <a:t>06.07.2025</a:t>
             </a:fld>
             <a:endParaRPr lang="de-DE"/>
           </a:p>
@@ -2070,7 +2074,7 @@
           <a:p>
             <a:fld id="{C4FF4887-CE9B-4F32-BB3E-621EACDFFFC6}" type="datetimeFigureOut">
               <a:rPr lang="de-DE" smtClean="0"/>
-              <a:t>05.07.2025</a:t>
+              <a:t>06.07.2025</a:t>
             </a:fld>
             <a:endParaRPr lang="de-DE"/>
           </a:p>
@@ -2381,7 +2385,7 @@
           <a:p>
             <a:fld id="{C4FF4887-CE9B-4F32-BB3E-621EACDFFFC6}" type="datetimeFigureOut">
               <a:rPr lang="de-DE" smtClean="0"/>
-              <a:t>05.07.2025</a:t>
+              <a:t>06.07.2025</a:t>
             </a:fld>
             <a:endParaRPr lang="de-DE"/>
           </a:p>
@@ -2669,7 +2673,7 @@
           <a:p>
             <a:fld id="{C4FF4887-CE9B-4F32-BB3E-621EACDFFFC6}" type="datetimeFigureOut">
               <a:rPr lang="de-DE" smtClean="0"/>
-              <a:t>05.07.2025</a:t>
+              <a:t>06.07.2025</a:t>
             </a:fld>
             <a:endParaRPr lang="de-DE"/>
           </a:p>
@@ -2910,7 +2914,7 @@
           <a:p>
             <a:fld id="{C4FF4887-CE9B-4F32-BB3E-621EACDFFFC6}" type="datetimeFigureOut">
               <a:rPr lang="de-DE" smtClean="0"/>
-              <a:t>05.07.2025</a:t>
+              <a:t>06.07.2025</a:t>
             </a:fld>
             <a:endParaRPr lang="de-DE"/>
           </a:p>
@@ -4077,6 +4081,42 @@
           </a:fontRef>
         </p:style>
       </p:cxnSp>
+      <p:sp>
+        <p:nvSpPr>
+          <p:cNvPr id="2" name="Textfeld 1">
+            <a:extLst>
+              <a:ext uri="{FF2B5EF4-FFF2-40B4-BE49-F238E27FC236}">
+                <a16:creationId xmlns:a16="http://schemas.microsoft.com/office/drawing/2014/main" id="{D4EDC7BC-D2E1-8338-2062-F6474130186E}"/>
+              </a:ext>
+            </a:extLst>
+          </p:cNvPr>
+          <p:cNvSpPr txBox="1"/>
+          <p:nvPr/>
+        </p:nvSpPr>
+        <p:spPr>
+          <a:xfrm>
+            <a:off x="0" y="6488668"/>
+            <a:ext cx="968727" cy="369332"/>
+          </a:xfrm>
+          <a:prstGeom prst="rect">
+            <a:avLst/>
+          </a:prstGeom>
+          <a:noFill/>
+        </p:spPr>
+        <p:txBody>
+          <a:bodyPr wrap="none" rtlCol="0">
+            <a:spAutoFit/>
+          </a:bodyPr>
+          <a:lstStyle/>
+          <a:p>
+            <a:r>
+              <a:rPr lang="de-DE" dirty="0" err="1"/>
+              <a:t>Context</a:t>
+            </a:r>
+            <a:endParaRPr lang="de-DE" dirty="0"/>
+          </a:p>
+        </p:txBody>
+      </p:sp>
     </p:spTree>
     <p:extLst>
       <p:ext uri="{BB962C8B-B14F-4D97-AF65-F5344CB8AC3E}">
@@ -5264,10 +5304,4050 @@
           </a:p>
         </p:txBody>
       </p:sp>
+      <p:sp>
+        <p:nvSpPr>
+          <p:cNvPr id="12" name="Textfeld 11">
+            <a:extLst>
+              <a:ext uri="{FF2B5EF4-FFF2-40B4-BE49-F238E27FC236}">
+                <a16:creationId xmlns:a16="http://schemas.microsoft.com/office/drawing/2014/main" id="{87C04D79-AAC5-E996-2E35-C42624A80E09}"/>
+              </a:ext>
+            </a:extLst>
+          </p:cNvPr>
+          <p:cNvSpPr txBox="1"/>
+          <p:nvPr/>
+        </p:nvSpPr>
+        <p:spPr>
+          <a:xfrm>
+            <a:off x="0" y="6488668"/>
+            <a:ext cx="875240" cy="369332"/>
+          </a:xfrm>
+          <a:prstGeom prst="rect">
+            <a:avLst/>
+          </a:prstGeom>
+          <a:noFill/>
+        </p:spPr>
+        <p:txBody>
+          <a:bodyPr wrap="none" rtlCol="0">
+            <a:spAutoFit/>
+          </a:bodyPr>
+          <a:lstStyle/>
+          <a:p>
+            <a:r>
+              <a:rPr lang="de-DE" dirty="0"/>
+              <a:t>Level 1</a:t>
+            </a:r>
+          </a:p>
+        </p:txBody>
+      </p:sp>
     </p:spTree>
     <p:extLst>
       <p:ext uri="{BB962C8B-B14F-4D97-AF65-F5344CB8AC3E}">
         <p14:creationId xmlns:p14="http://schemas.microsoft.com/office/powerpoint/2010/main" val="3901491223"/>
+      </p:ext>
+    </p:extLst>
+  </p:cSld>
+  <p:clrMapOvr>
+    <a:masterClrMapping/>
+  </p:clrMapOvr>
+</p:sld>
+</file>
+
+<file path=ppt/slides/slide3.xml><?xml version="1.0" encoding="utf-8"?>
+<p:sld xmlns:a="http://schemas.openxmlformats.org/drawingml/2006/main" xmlns:r="http://schemas.openxmlformats.org/officeDocument/2006/relationships" xmlns:p="http://schemas.openxmlformats.org/presentationml/2006/main">
+  <p:cSld>
+    <p:spTree>
+      <p:nvGrpSpPr>
+        <p:cNvPr id="1" name="">
+          <a:extLst>
+            <a:ext uri="{FF2B5EF4-FFF2-40B4-BE49-F238E27FC236}">
+              <a16:creationId xmlns:a16="http://schemas.microsoft.com/office/drawing/2014/main" id="{ED4B52B4-C314-35A0-C682-3101A23787A9}"/>
+            </a:ext>
+          </a:extLst>
+        </p:cNvPr>
+        <p:cNvGrpSpPr/>
+        <p:nvPr/>
+      </p:nvGrpSpPr>
+      <p:grpSpPr>
+        <a:xfrm>
+          <a:off x="0" y="0"/>
+          <a:ext cx="0" cy="0"/>
+          <a:chOff x="0" y="0"/>
+          <a:chExt cx="0" cy="0"/>
+        </a:xfrm>
+      </p:grpSpPr>
+      <p:cxnSp>
+        <p:nvCxnSpPr>
+          <p:cNvPr id="16" name="Gerade Verbindung mit Pfeil 15">
+            <a:extLst>
+              <a:ext uri="{FF2B5EF4-FFF2-40B4-BE49-F238E27FC236}">
+                <a16:creationId xmlns:a16="http://schemas.microsoft.com/office/drawing/2014/main" id="{6CF0D566-3AB8-AA3F-1F7D-59EEFFC17C22}"/>
+              </a:ext>
+            </a:extLst>
+          </p:cNvPr>
+          <p:cNvCxnSpPr>
+            <a:cxnSpLocks/>
+          </p:cNvCxnSpPr>
+          <p:nvPr/>
+        </p:nvCxnSpPr>
+        <p:spPr>
+          <a:xfrm flipV="1">
+            <a:off x="10220706" y="542544"/>
+            <a:ext cx="414292" cy="1"/>
+          </a:xfrm>
+          <a:prstGeom prst="straightConnector1">
+            <a:avLst/>
+          </a:prstGeom>
+          <a:ln>
+            <a:solidFill>
+              <a:schemeClr val="tx1"/>
+            </a:solidFill>
+            <a:tailEnd type="triangle"/>
+          </a:ln>
+        </p:spPr>
+        <p:style>
+          <a:lnRef idx="2">
+            <a:schemeClr val="accent1"/>
+          </a:lnRef>
+          <a:fillRef idx="0">
+            <a:schemeClr val="accent1"/>
+          </a:fillRef>
+          <a:effectRef idx="1">
+            <a:schemeClr val="accent1"/>
+          </a:effectRef>
+          <a:fontRef idx="minor">
+            <a:schemeClr val="tx1"/>
+          </a:fontRef>
+        </p:style>
+      </p:cxnSp>
+      <p:cxnSp>
+        <p:nvCxnSpPr>
+          <p:cNvPr id="35" name="Gerader Verbinder 34">
+            <a:extLst>
+              <a:ext uri="{FF2B5EF4-FFF2-40B4-BE49-F238E27FC236}">
+                <a16:creationId xmlns:a16="http://schemas.microsoft.com/office/drawing/2014/main" id="{565810E3-D43F-A3A8-39AC-4B7E75E08903}"/>
+              </a:ext>
+            </a:extLst>
+          </p:cNvPr>
+          <p:cNvCxnSpPr>
+            <a:cxnSpLocks/>
+          </p:cNvCxnSpPr>
+          <p:nvPr/>
+        </p:nvCxnSpPr>
+        <p:spPr>
+          <a:xfrm>
+            <a:off x="11645746" y="398907"/>
+            <a:ext cx="0" cy="678180"/>
+          </a:xfrm>
+          <a:prstGeom prst="line">
+            <a:avLst/>
+          </a:prstGeom>
+        </p:spPr>
+        <p:style>
+          <a:lnRef idx="2">
+            <a:schemeClr val="dk1"/>
+          </a:lnRef>
+          <a:fillRef idx="0">
+            <a:schemeClr val="dk1"/>
+          </a:fillRef>
+          <a:effectRef idx="1">
+            <a:schemeClr val="dk1"/>
+          </a:effectRef>
+          <a:fontRef idx="minor">
+            <a:schemeClr val="tx1"/>
+          </a:fontRef>
+        </p:style>
+      </p:cxnSp>
+      <p:sp>
+        <p:nvSpPr>
+          <p:cNvPr id="55" name="Textfeld 54">
+            <a:extLst>
+              <a:ext uri="{FF2B5EF4-FFF2-40B4-BE49-F238E27FC236}">
+                <a16:creationId xmlns:a16="http://schemas.microsoft.com/office/drawing/2014/main" id="{EC52D961-9CBF-3170-6BA8-0FEFE7E5F398}"/>
+              </a:ext>
+            </a:extLst>
+          </p:cNvPr>
+          <p:cNvSpPr txBox="1"/>
+          <p:nvPr/>
+        </p:nvSpPr>
+        <p:spPr>
+          <a:xfrm>
+            <a:off x="4475821" y="1076628"/>
+            <a:ext cx="1493742" cy="307777"/>
+          </a:xfrm>
+          <a:prstGeom prst="rect">
+            <a:avLst/>
+          </a:prstGeom>
+          <a:noFill/>
+        </p:spPr>
+        <p:txBody>
+          <a:bodyPr wrap="none" rtlCol="0">
+            <a:spAutoFit/>
+          </a:bodyPr>
+          <a:lstStyle/>
+          <a:p>
+            <a:pPr algn="ctr"/>
+            <a:r>
+              <a:rPr lang="de-DE" sz="1400" dirty="0"/>
+              <a:t>Leve 2 fehlt noch</a:t>
+            </a:r>
+          </a:p>
+        </p:txBody>
+      </p:sp>
+      <p:sp>
+        <p:nvSpPr>
+          <p:cNvPr id="12" name="Textfeld 11">
+            <a:extLst>
+              <a:ext uri="{FF2B5EF4-FFF2-40B4-BE49-F238E27FC236}">
+                <a16:creationId xmlns:a16="http://schemas.microsoft.com/office/drawing/2014/main" id="{451761A6-95C3-1CB5-D485-C914F01C51A8}"/>
+              </a:ext>
+            </a:extLst>
+          </p:cNvPr>
+          <p:cNvSpPr txBox="1"/>
+          <p:nvPr/>
+        </p:nvSpPr>
+        <p:spPr>
+          <a:xfrm>
+            <a:off x="0" y="6488668"/>
+            <a:ext cx="875240" cy="369332"/>
+          </a:xfrm>
+          <a:prstGeom prst="rect">
+            <a:avLst/>
+          </a:prstGeom>
+          <a:noFill/>
+        </p:spPr>
+        <p:txBody>
+          <a:bodyPr wrap="none" rtlCol="0">
+            <a:spAutoFit/>
+          </a:bodyPr>
+          <a:lstStyle/>
+          <a:p>
+            <a:r>
+              <a:rPr lang="de-DE" dirty="0"/>
+              <a:t>Level 2</a:t>
+            </a:r>
+          </a:p>
+        </p:txBody>
+      </p:sp>
+    </p:spTree>
+    <p:extLst>
+      <p:ext uri="{BB962C8B-B14F-4D97-AF65-F5344CB8AC3E}">
+        <p14:creationId xmlns:p14="http://schemas.microsoft.com/office/powerpoint/2010/main" val="524479109"/>
+      </p:ext>
+    </p:extLst>
+  </p:cSld>
+  <p:clrMapOvr>
+    <a:masterClrMapping/>
+  </p:clrMapOvr>
+</p:sld>
+</file>
+
+<file path=ppt/slides/slide4.xml><?xml version="1.0" encoding="utf-8"?>
+<p:sld xmlns:a="http://schemas.openxmlformats.org/drawingml/2006/main" xmlns:r="http://schemas.openxmlformats.org/officeDocument/2006/relationships" xmlns:p="http://schemas.openxmlformats.org/presentationml/2006/main">
+  <p:cSld>
+    <p:spTree>
+      <p:nvGrpSpPr>
+        <p:cNvPr id="1" name="">
+          <a:extLst>
+            <a:ext uri="{FF2B5EF4-FFF2-40B4-BE49-F238E27FC236}">
+              <a16:creationId xmlns:a16="http://schemas.microsoft.com/office/drawing/2014/main" id="{696D65B8-FCBB-90E8-D3D2-EFFB404E5EB6}"/>
+            </a:ext>
+          </a:extLst>
+        </p:cNvPr>
+        <p:cNvGrpSpPr/>
+        <p:nvPr/>
+      </p:nvGrpSpPr>
+      <p:grpSpPr>
+        <a:xfrm>
+          <a:off x="0" y="0"/>
+          <a:ext cx="0" cy="0"/>
+          <a:chOff x="0" y="0"/>
+          <a:chExt cx="0" cy="0"/>
+        </a:xfrm>
+      </p:grpSpPr>
+      <p:cxnSp>
+        <p:nvCxnSpPr>
+          <p:cNvPr id="213" name="Verbinder: gekrümmt 212">
+            <a:extLst>
+              <a:ext uri="{FF2B5EF4-FFF2-40B4-BE49-F238E27FC236}">
+                <a16:creationId xmlns:a16="http://schemas.microsoft.com/office/drawing/2014/main" id="{59677F49-3714-79AB-BED1-D246ABF7B82F}"/>
+              </a:ext>
+            </a:extLst>
+          </p:cNvPr>
+          <p:cNvCxnSpPr>
+            <a:cxnSpLocks/>
+            <a:stCxn id="199" idx="3"/>
+            <a:endCxn id="170" idx="1"/>
+          </p:cNvCxnSpPr>
+          <p:nvPr/>
+        </p:nvCxnSpPr>
+        <p:spPr>
+          <a:xfrm>
+            <a:off x="1626057" y="393557"/>
+            <a:ext cx="1112138" cy="389566"/>
+          </a:xfrm>
+          <a:prstGeom prst="curvedConnector3">
+            <a:avLst>
+              <a:gd name="adj1" fmla="val 50000"/>
+            </a:avLst>
+          </a:prstGeom>
+          <a:ln>
+            <a:prstDash val="sysDot"/>
+            <a:tailEnd type="triangle"/>
+          </a:ln>
+        </p:spPr>
+        <p:style>
+          <a:lnRef idx="2">
+            <a:schemeClr val="accent5"/>
+          </a:lnRef>
+          <a:fillRef idx="0">
+            <a:schemeClr val="accent5"/>
+          </a:fillRef>
+          <a:effectRef idx="1">
+            <a:schemeClr val="accent5"/>
+          </a:effectRef>
+          <a:fontRef idx="minor">
+            <a:schemeClr val="tx1"/>
+          </a:fontRef>
+        </p:style>
+      </p:cxnSp>
+      <p:cxnSp>
+        <p:nvCxnSpPr>
+          <p:cNvPr id="210" name="Verbinder: gekrümmt 209">
+            <a:extLst>
+              <a:ext uri="{FF2B5EF4-FFF2-40B4-BE49-F238E27FC236}">
+                <a16:creationId xmlns:a16="http://schemas.microsoft.com/office/drawing/2014/main" id="{073FC15E-DC53-438E-384C-3F36A7C8183C}"/>
+              </a:ext>
+            </a:extLst>
+          </p:cNvPr>
+          <p:cNvCxnSpPr>
+            <a:cxnSpLocks/>
+            <a:stCxn id="232" idx="2"/>
+            <a:endCxn id="89" idx="0"/>
+          </p:cNvCxnSpPr>
+          <p:nvPr/>
+        </p:nvCxnSpPr>
+        <p:spPr>
+          <a:xfrm rot="5400000">
+            <a:off x="10873695" y="1257322"/>
+            <a:ext cx="905393" cy="107498"/>
+          </a:xfrm>
+          <a:prstGeom prst="curvedConnector3">
+            <a:avLst>
+              <a:gd name="adj1" fmla="val 50000"/>
+            </a:avLst>
+          </a:prstGeom>
+          <a:ln>
+            <a:prstDash val="sysDot"/>
+            <a:tailEnd type="triangle"/>
+          </a:ln>
+        </p:spPr>
+        <p:style>
+          <a:lnRef idx="2">
+            <a:schemeClr val="accent5"/>
+          </a:lnRef>
+          <a:fillRef idx="0">
+            <a:schemeClr val="accent5"/>
+          </a:fillRef>
+          <a:effectRef idx="1">
+            <a:schemeClr val="accent5"/>
+          </a:effectRef>
+          <a:fontRef idx="minor">
+            <a:schemeClr val="tx1"/>
+          </a:fontRef>
+        </p:style>
+      </p:cxnSp>
+      <p:cxnSp>
+        <p:nvCxnSpPr>
+          <p:cNvPr id="200" name="Verbinder: gekrümmt 199">
+            <a:extLst>
+              <a:ext uri="{FF2B5EF4-FFF2-40B4-BE49-F238E27FC236}">
+                <a16:creationId xmlns:a16="http://schemas.microsoft.com/office/drawing/2014/main" id="{FBFC6DF9-496B-F62A-82B0-DF7900CBFEC5}"/>
+              </a:ext>
+            </a:extLst>
+          </p:cNvPr>
+          <p:cNvCxnSpPr>
+            <a:cxnSpLocks/>
+            <a:stCxn id="199" idx="3"/>
+            <a:endCxn id="3" idx="0"/>
+          </p:cNvCxnSpPr>
+          <p:nvPr/>
+        </p:nvCxnSpPr>
+        <p:spPr>
+          <a:xfrm>
+            <a:off x="1626057" y="393557"/>
+            <a:ext cx="762169" cy="1369781"/>
+          </a:xfrm>
+          <a:prstGeom prst="curvedConnector2">
+            <a:avLst/>
+          </a:prstGeom>
+          <a:ln>
+            <a:prstDash val="sysDot"/>
+            <a:tailEnd type="triangle"/>
+          </a:ln>
+        </p:spPr>
+        <p:style>
+          <a:lnRef idx="2">
+            <a:schemeClr val="accent5"/>
+          </a:lnRef>
+          <a:fillRef idx="0">
+            <a:schemeClr val="accent5"/>
+          </a:fillRef>
+          <a:effectRef idx="1">
+            <a:schemeClr val="accent5"/>
+          </a:effectRef>
+          <a:fontRef idx="minor">
+            <a:schemeClr val="tx1"/>
+          </a:fontRef>
+        </p:style>
+      </p:cxnSp>
+      <p:cxnSp>
+        <p:nvCxnSpPr>
+          <p:cNvPr id="175" name="Verbinder: gekrümmt 174">
+            <a:extLst>
+              <a:ext uri="{FF2B5EF4-FFF2-40B4-BE49-F238E27FC236}">
+                <a16:creationId xmlns:a16="http://schemas.microsoft.com/office/drawing/2014/main" id="{C55F79B9-0B37-032E-BFD0-D4CD3D0F2081}"/>
+              </a:ext>
+            </a:extLst>
+          </p:cNvPr>
+          <p:cNvCxnSpPr>
+            <a:cxnSpLocks/>
+            <a:stCxn id="170" idx="3"/>
+            <a:endCxn id="50" idx="0"/>
+          </p:cNvCxnSpPr>
+          <p:nvPr/>
+        </p:nvCxnSpPr>
+        <p:spPr>
+          <a:xfrm>
+            <a:off x="4137587" y="783123"/>
+            <a:ext cx="1713279" cy="3683211"/>
+          </a:xfrm>
+          <a:prstGeom prst="curvedConnector2">
+            <a:avLst/>
+          </a:prstGeom>
+          <a:ln>
+            <a:prstDash val="sysDot"/>
+            <a:tailEnd type="triangle"/>
+          </a:ln>
+        </p:spPr>
+        <p:style>
+          <a:lnRef idx="2">
+            <a:schemeClr val="accent5"/>
+          </a:lnRef>
+          <a:fillRef idx="0">
+            <a:schemeClr val="accent5"/>
+          </a:fillRef>
+          <a:effectRef idx="1">
+            <a:schemeClr val="accent5"/>
+          </a:effectRef>
+          <a:fontRef idx="minor">
+            <a:schemeClr val="tx1"/>
+          </a:fontRef>
+        </p:style>
+      </p:cxnSp>
+      <p:cxnSp>
+        <p:nvCxnSpPr>
+          <p:cNvPr id="16" name="Gerade Verbindung mit Pfeil 15">
+            <a:extLst>
+              <a:ext uri="{FF2B5EF4-FFF2-40B4-BE49-F238E27FC236}">
+                <a16:creationId xmlns:a16="http://schemas.microsoft.com/office/drawing/2014/main" id="{4D541D4D-F8D9-2453-07F7-55C4AD9F363F}"/>
+              </a:ext>
+            </a:extLst>
+          </p:cNvPr>
+          <p:cNvCxnSpPr>
+            <a:cxnSpLocks/>
+          </p:cNvCxnSpPr>
+          <p:nvPr/>
+        </p:nvCxnSpPr>
+        <p:spPr>
+          <a:xfrm flipV="1">
+            <a:off x="11464908" y="6052359"/>
+            <a:ext cx="414292" cy="1"/>
+          </a:xfrm>
+          <a:prstGeom prst="straightConnector1">
+            <a:avLst/>
+          </a:prstGeom>
+          <a:ln>
+            <a:solidFill>
+              <a:schemeClr val="tx1"/>
+            </a:solidFill>
+            <a:tailEnd type="triangle"/>
+          </a:ln>
+        </p:spPr>
+        <p:style>
+          <a:lnRef idx="2">
+            <a:schemeClr val="accent1"/>
+          </a:lnRef>
+          <a:fillRef idx="0">
+            <a:schemeClr val="accent1"/>
+          </a:fillRef>
+          <a:effectRef idx="1">
+            <a:schemeClr val="accent1"/>
+          </a:effectRef>
+          <a:fontRef idx="minor">
+            <a:schemeClr val="tx1"/>
+          </a:fontRef>
+        </p:style>
+      </p:cxnSp>
+      <p:sp>
+        <p:nvSpPr>
+          <p:cNvPr id="12" name="Textfeld 11">
+            <a:extLst>
+              <a:ext uri="{FF2B5EF4-FFF2-40B4-BE49-F238E27FC236}">
+                <a16:creationId xmlns:a16="http://schemas.microsoft.com/office/drawing/2014/main" id="{3FA06DEF-F790-3A81-0BEC-3A31DAFF629F}"/>
+              </a:ext>
+            </a:extLst>
+          </p:cNvPr>
+          <p:cNvSpPr txBox="1"/>
+          <p:nvPr/>
+        </p:nvSpPr>
+        <p:spPr>
+          <a:xfrm>
+            <a:off x="10856198" y="5867693"/>
+            <a:ext cx="428322" cy="276999"/>
+          </a:xfrm>
+          <a:prstGeom prst="rect">
+            <a:avLst/>
+          </a:prstGeom>
+          <a:noFill/>
+        </p:spPr>
+        <p:txBody>
+          <a:bodyPr wrap="none" rtlCol="0">
+            <a:spAutoFit/>
+          </a:bodyPr>
+          <a:lstStyle/>
+          <a:p>
+            <a:r>
+              <a:rPr lang="de-DE" sz="1200" dirty="0" err="1"/>
+              <a:t>use</a:t>
+            </a:r>
+            <a:endParaRPr lang="de-DE" sz="1200" dirty="0"/>
+          </a:p>
+        </p:txBody>
+      </p:sp>
+      <p:sp>
+        <p:nvSpPr>
+          <p:cNvPr id="2" name="Rechteck 1">
+            <a:extLst>
+              <a:ext uri="{FF2B5EF4-FFF2-40B4-BE49-F238E27FC236}">
+                <a16:creationId xmlns:a16="http://schemas.microsoft.com/office/drawing/2014/main" id="{D07F9940-0146-C90F-85A0-E3A44C2FCE95}"/>
+              </a:ext>
+            </a:extLst>
+          </p:cNvPr>
+          <p:cNvSpPr/>
+          <p:nvPr/>
+        </p:nvSpPr>
+        <p:spPr>
+          <a:xfrm>
+            <a:off x="153412" y="3185058"/>
+            <a:ext cx="1202835" cy="742566"/>
+          </a:xfrm>
+          <a:prstGeom prst="rect">
+            <a:avLst/>
+          </a:prstGeom>
+        </p:spPr>
+        <p:style>
+          <a:lnRef idx="2">
+            <a:schemeClr val="accent1">
+              <a:shade val="15000"/>
+            </a:schemeClr>
+          </a:lnRef>
+          <a:fillRef idx="1">
+            <a:schemeClr val="accent1"/>
+          </a:fillRef>
+          <a:effectRef idx="0">
+            <a:schemeClr val="accent1"/>
+          </a:effectRef>
+          <a:fontRef idx="minor">
+            <a:schemeClr val="lt1"/>
+          </a:fontRef>
+        </p:style>
+        <p:txBody>
+          <a:bodyPr rtlCol="0" anchor="ctr"/>
+          <a:lstStyle/>
+          <a:p>
+            <a:pPr algn="ctr"/>
+            <a:r>
+              <a:rPr lang="de-DE" sz="1200" dirty="0" err="1"/>
+              <a:t>LowLevel</a:t>
+            </a:r>
+            <a:br>
+              <a:rPr lang="de-DE" sz="1200" dirty="0"/>
+            </a:br>
+            <a:r>
+              <a:rPr lang="de-DE" sz="1200" dirty="0"/>
+              <a:t>Screen</a:t>
+            </a:r>
+          </a:p>
+        </p:txBody>
+      </p:sp>
+      <p:sp>
+        <p:nvSpPr>
+          <p:cNvPr id="3" name="Rechteck 2">
+            <a:extLst>
+              <a:ext uri="{FF2B5EF4-FFF2-40B4-BE49-F238E27FC236}">
+                <a16:creationId xmlns:a16="http://schemas.microsoft.com/office/drawing/2014/main" id="{C5207C98-9306-231D-D02A-69580725D2F9}"/>
+              </a:ext>
+            </a:extLst>
+          </p:cNvPr>
+          <p:cNvSpPr/>
+          <p:nvPr/>
+        </p:nvSpPr>
+        <p:spPr>
+          <a:xfrm>
+            <a:off x="1735709" y="1763338"/>
+            <a:ext cx="1305034" cy="742566"/>
+          </a:xfrm>
+          <a:prstGeom prst="rect">
+            <a:avLst/>
+          </a:prstGeom>
+        </p:spPr>
+        <p:style>
+          <a:lnRef idx="2">
+            <a:schemeClr val="accent1">
+              <a:shade val="15000"/>
+            </a:schemeClr>
+          </a:lnRef>
+          <a:fillRef idx="1">
+            <a:schemeClr val="accent1"/>
+          </a:fillRef>
+          <a:effectRef idx="0">
+            <a:schemeClr val="accent1"/>
+          </a:effectRef>
+          <a:fontRef idx="minor">
+            <a:schemeClr val="lt1"/>
+          </a:fontRef>
+        </p:style>
+        <p:txBody>
+          <a:bodyPr rtlCol="0" anchor="ctr"/>
+          <a:lstStyle/>
+          <a:p>
+            <a:pPr algn="ctr"/>
+            <a:r>
+              <a:rPr lang="de-DE" sz="1200" dirty="0"/>
+              <a:t>&lt;&lt;interface&gt;&gt;</a:t>
+            </a:r>
+          </a:p>
+          <a:p>
+            <a:pPr algn="ctr"/>
+            <a:r>
+              <a:rPr lang="de-DE" sz="1200" dirty="0" err="1"/>
+              <a:t>S.O.Producer</a:t>
+            </a:r>
+            <a:endParaRPr lang="de-DE" sz="1200" dirty="0"/>
+          </a:p>
+        </p:txBody>
+      </p:sp>
+      <p:sp>
+        <p:nvSpPr>
+          <p:cNvPr id="4" name="Rechteck 3">
+            <a:extLst>
+              <a:ext uri="{FF2B5EF4-FFF2-40B4-BE49-F238E27FC236}">
+                <a16:creationId xmlns:a16="http://schemas.microsoft.com/office/drawing/2014/main" id="{4A3D2F9E-2D08-ED9B-4EA3-A9C019751AD2}"/>
+              </a:ext>
+            </a:extLst>
+          </p:cNvPr>
+          <p:cNvSpPr/>
+          <p:nvPr/>
+        </p:nvSpPr>
+        <p:spPr>
+          <a:xfrm>
+            <a:off x="1766592" y="4466334"/>
+            <a:ext cx="1274151" cy="742566"/>
+          </a:xfrm>
+          <a:prstGeom prst="rect">
+            <a:avLst/>
+          </a:prstGeom>
+        </p:spPr>
+        <p:style>
+          <a:lnRef idx="2">
+            <a:schemeClr val="accent1">
+              <a:shade val="15000"/>
+            </a:schemeClr>
+          </a:lnRef>
+          <a:fillRef idx="1">
+            <a:schemeClr val="accent1"/>
+          </a:fillRef>
+          <a:effectRef idx="0">
+            <a:schemeClr val="accent1"/>
+          </a:effectRef>
+          <a:fontRef idx="minor">
+            <a:schemeClr val="lt1"/>
+          </a:fontRef>
+        </p:style>
+        <p:txBody>
+          <a:bodyPr rtlCol="0" anchor="ctr"/>
+          <a:lstStyle/>
+          <a:p>
+            <a:pPr algn="ctr"/>
+            <a:r>
+              <a:rPr lang="de-DE" sz="1200" dirty="0"/>
+              <a:t>&lt;&lt;interface&gt;&gt;</a:t>
+            </a:r>
+            <a:br>
+              <a:rPr lang="de-DE" sz="1200" dirty="0"/>
+            </a:br>
+            <a:r>
+              <a:rPr lang="de-DE" sz="1200" dirty="0" err="1"/>
+              <a:t>S.R.Consumer</a:t>
+            </a:r>
+            <a:endParaRPr lang="de-DE" sz="1200" dirty="0"/>
+          </a:p>
+        </p:txBody>
+      </p:sp>
+      <p:cxnSp>
+        <p:nvCxnSpPr>
+          <p:cNvPr id="6" name="Gerade Verbindung mit Pfeil 5">
+            <a:extLst>
+              <a:ext uri="{FF2B5EF4-FFF2-40B4-BE49-F238E27FC236}">
+                <a16:creationId xmlns:a16="http://schemas.microsoft.com/office/drawing/2014/main" id="{E25D9D4D-C974-55B9-BB83-6DD1C0E81365}"/>
+              </a:ext>
+            </a:extLst>
+          </p:cNvPr>
+          <p:cNvCxnSpPr>
+            <a:cxnSpLocks/>
+            <a:stCxn id="2" idx="3"/>
+            <a:endCxn id="3" idx="1"/>
+          </p:cNvCxnSpPr>
+          <p:nvPr/>
+        </p:nvCxnSpPr>
+        <p:spPr>
+          <a:xfrm flipV="1">
+            <a:off x="1356247" y="2134621"/>
+            <a:ext cx="379462" cy="1421720"/>
+          </a:xfrm>
+          <a:prstGeom prst="straightConnector1">
+            <a:avLst/>
+          </a:prstGeom>
+          <a:ln>
+            <a:tailEnd type="triangle"/>
+          </a:ln>
+        </p:spPr>
+        <p:style>
+          <a:lnRef idx="2">
+            <a:schemeClr val="accent1"/>
+          </a:lnRef>
+          <a:fillRef idx="0">
+            <a:schemeClr val="accent1"/>
+          </a:fillRef>
+          <a:effectRef idx="1">
+            <a:schemeClr val="accent1"/>
+          </a:effectRef>
+          <a:fontRef idx="minor">
+            <a:schemeClr val="tx1"/>
+          </a:fontRef>
+        </p:style>
+      </p:cxnSp>
+      <p:cxnSp>
+        <p:nvCxnSpPr>
+          <p:cNvPr id="7" name="Gerade Verbindung mit Pfeil 6">
+            <a:extLst>
+              <a:ext uri="{FF2B5EF4-FFF2-40B4-BE49-F238E27FC236}">
+                <a16:creationId xmlns:a16="http://schemas.microsoft.com/office/drawing/2014/main" id="{024C9577-0A8B-6C8D-F37F-4EC7EEAD2F73}"/>
+              </a:ext>
+            </a:extLst>
+          </p:cNvPr>
+          <p:cNvCxnSpPr>
+            <a:cxnSpLocks/>
+            <a:stCxn id="2" idx="3"/>
+            <a:endCxn id="4" idx="1"/>
+          </p:cNvCxnSpPr>
+          <p:nvPr/>
+        </p:nvCxnSpPr>
+        <p:spPr>
+          <a:xfrm>
+            <a:off x="1356247" y="3556341"/>
+            <a:ext cx="410345" cy="1281276"/>
+          </a:xfrm>
+          <a:prstGeom prst="straightConnector1">
+            <a:avLst/>
+          </a:prstGeom>
+          <a:ln>
+            <a:tailEnd type="triangle"/>
+          </a:ln>
+        </p:spPr>
+        <p:style>
+          <a:lnRef idx="2">
+            <a:schemeClr val="accent1"/>
+          </a:lnRef>
+          <a:fillRef idx="0">
+            <a:schemeClr val="accent1"/>
+          </a:fillRef>
+          <a:effectRef idx="1">
+            <a:schemeClr val="accent1"/>
+          </a:effectRef>
+          <a:fontRef idx="minor">
+            <a:schemeClr val="tx1"/>
+          </a:fontRef>
+        </p:style>
+      </p:cxnSp>
+      <p:sp>
+        <p:nvSpPr>
+          <p:cNvPr id="10" name="Rechteck 9">
+            <a:extLst>
+              <a:ext uri="{FF2B5EF4-FFF2-40B4-BE49-F238E27FC236}">
+                <a16:creationId xmlns:a16="http://schemas.microsoft.com/office/drawing/2014/main" id="{5F2A0609-6698-ADBF-83D1-36E49BD20AAD}"/>
+              </a:ext>
+            </a:extLst>
+          </p:cNvPr>
+          <p:cNvSpPr/>
+          <p:nvPr/>
+        </p:nvSpPr>
+        <p:spPr>
+          <a:xfrm>
+            <a:off x="3472252" y="1763338"/>
+            <a:ext cx="1335460" cy="742566"/>
+          </a:xfrm>
+          <a:prstGeom prst="rect">
+            <a:avLst/>
+          </a:prstGeom>
+        </p:spPr>
+        <p:style>
+          <a:lnRef idx="2">
+            <a:schemeClr val="accent1">
+              <a:shade val="15000"/>
+            </a:schemeClr>
+          </a:lnRef>
+          <a:fillRef idx="1">
+            <a:schemeClr val="accent1"/>
+          </a:fillRef>
+          <a:effectRef idx="0">
+            <a:schemeClr val="accent1"/>
+          </a:effectRef>
+          <a:fontRef idx="minor">
+            <a:schemeClr val="lt1"/>
+          </a:fontRef>
+        </p:style>
+        <p:txBody>
+          <a:bodyPr rtlCol="0" anchor="ctr"/>
+          <a:lstStyle/>
+          <a:p>
+            <a:pPr algn="ctr"/>
+            <a:r>
+              <a:rPr lang="de-DE" sz="1200" dirty="0" err="1"/>
+              <a:t>S.O.Producer</a:t>
+            </a:r>
+            <a:endParaRPr lang="de-DE" sz="1200" dirty="0"/>
+          </a:p>
+        </p:txBody>
+      </p:sp>
+      <p:cxnSp>
+        <p:nvCxnSpPr>
+          <p:cNvPr id="11" name="Gerade Verbindung mit Pfeil 10">
+            <a:extLst>
+              <a:ext uri="{FF2B5EF4-FFF2-40B4-BE49-F238E27FC236}">
+                <a16:creationId xmlns:a16="http://schemas.microsoft.com/office/drawing/2014/main" id="{816651F2-4560-CE9C-A83F-32A5E581D39A}"/>
+              </a:ext>
+            </a:extLst>
+          </p:cNvPr>
+          <p:cNvCxnSpPr>
+            <a:cxnSpLocks/>
+            <a:stCxn id="10" idx="1"/>
+            <a:endCxn id="3" idx="3"/>
+          </p:cNvCxnSpPr>
+          <p:nvPr/>
+        </p:nvCxnSpPr>
+        <p:spPr>
+          <a:xfrm flipH="1">
+            <a:off x="3040743" y="2134621"/>
+            <a:ext cx="431509" cy="0"/>
+          </a:xfrm>
+          <a:prstGeom prst="straightConnector1">
+            <a:avLst/>
+          </a:prstGeom>
+          <a:ln>
+            <a:prstDash val="sysDash"/>
+            <a:tailEnd type="triangle"/>
+          </a:ln>
+        </p:spPr>
+        <p:style>
+          <a:lnRef idx="2">
+            <a:schemeClr val="accent1"/>
+          </a:lnRef>
+          <a:fillRef idx="0">
+            <a:schemeClr val="accent1"/>
+          </a:fillRef>
+          <a:effectRef idx="1">
+            <a:schemeClr val="accent1"/>
+          </a:effectRef>
+          <a:fontRef idx="minor">
+            <a:schemeClr val="tx1"/>
+          </a:fontRef>
+        </p:style>
+      </p:cxnSp>
+      <p:sp>
+        <p:nvSpPr>
+          <p:cNvPr id="21" name="Rechteck 20">
+            <a:extLst>
+              <a:ext uri="{FF2B5EF4-FFF2-40B4-BE49-F238E27FC236}">
+                <a16:creationId xmlns:a16="http://schemas.microsoft.com/office/drawing/2014/main" id="{2757E580-3DB9-34C6-0544-3CE227FA092A}"/>
+              </a:ext>
+            </a:extLst>
+          </p:cNvPr>
+          <p:cNvSpPr/>
+          <p:nvPr/>
+        </p:nvSpPr>
+        <p:spPr>
+          <a:xfrm>
+            <a:off x="5296378" y="1763190"/>
+            <a:ext cx="1108977" cy="742566"/>
+          </a:xfrm>
+          <a:prstGeom prst="rect">
+            <a:avLst/>
+          </a:prstGeom>
+        </p:spPr>
+        <p:style>
+          <a:lnRef idx="2">
+            <a:schemeClr val="accent1">
+              <a:shade val="15000"/>
+            </a:schemeClr>
+          </a:lnRef>
+          <a:fillRef idx="1">
+            <a:schemeClr val="accent1"/>
+          </a:fillRef>
+          <a:effectRef idx="0">
+            <a:schemeClr val="accent1"/>
+          </a:effectRef>
+          <a:fontRef idx="minor">
+            <a:schemeClr val="lt1"/>
+          </a:fontRef>
+        </p:style>
+        <p:txBody>
+          <a:bodyPr rtlCol="0" anchor="ctr"/>
+          <a:lstStyle/>
+          <a:p>
+            <a:pPr algn="ctr"/>
+            <a:r>
+              <a:rPr lang="de-DE" sz="1200" dirty="0"/>
+              <a:t>&lt;&lt;interface&gt;&gt;</a:t>
+            </a:r>
+          </a:p>
+          <a:p>
+            <a:pPr algn="ctr"/>
+            <a:r>
+              <a:rPr lang="de-DE" sz="1200" dirty="0" err="1"/>
+              <a:t>S.O.Channel</a:t>
+            </a:r>
+            <a:endParaRPr lang="de-DE" sz="1200" dirty="0"/>
+          </a:p>
+        </p:txBody>
+      </p:sp>
+      <p:cxnSp>
+        <p:nvCxnSpPr>
+          <p:cNvPr id="22" name="Gerade Verbindung mit Pfeil 21">
+            <a:extLst>
+              <a:ext uri="{FF2B5EF4-FFF2-40B4-BE49-F238E27FC236}">
+                <a16:creationId xmlns:a16="http://schemas.microsoft.com/office/drawing/2014/main" id="{C6E6E190-FB80-A3F7-F231-EE8111EECB22}"/>
+              </a:ext>
+            </a:extLst>
+          </p:cNvPr>
+          <p:cNvCxnSpPr>
+            <a:cxnSpLocks/>
+            <a:stCxn id="10" idx="3"/>
+            <a:endCxn id="21" idx="1"/>
+          </p:cNvCxnSpPr>
+          <p:nvPr/>
+        </p:nvCxnSpPr>
+        <p:spPr>
+          <a:xfrm flipV="1">
+            <a:off x="4807712" y="2134473"/>
+            <a:ext cx="488666" cy="148"/>
+          </a:xfrm>
+          <a:prstGeom prst="straightConnector1">
+            <a:avLst/>
+          </a:prstGeom>
+          <a:ln>
+            <a:tailEnd type="triangle"/>
+          </a:ln>
+        </p:spPr>
+        <p:style>
+          <a:lnRef idx="2">
+            <a:schemeClr val="accent1"/>
+          </a:lnRef>
+          <a:fillRef idx="0">
+            <a:schemeClr val="accent1"/>
+          </a:fillRef>
+          <a:effectRef idx="1">
+            <a:schemeClr val="accent1"/>
+          </a:effectRef>
+          <a:fontRef idx="minor">
+            <a:schemeClr val="tx1"/>
+          </a:fontRef>
+        </p:style>
+      </p:cxnSp>
+      <p:sp>
+        <p:nvSpPr>
+          <p:cNvPr id="38" name="Textfeld 37">
+            <a:extLst>
+              <a:ext uri="{FF2B5EF4-FFF2-40B4-BE49-F238E27FC236}">
+                <a16:creationId xmlns:a16="http://schemas.microsoft.com/office/drawing/2014/main" id="{B68431F1-D102-3457-787B-C5A2897E8494}"/>
+              </a:ext>
+            </a:extLst>
+          </p:cNvPr>
+          <p:cNvSpPr txBox="1"/>
+          <p:nvPr/>
+        </p:nvSpPr>
+        <p:spPr>
+          <a:xfrm>
+            <a:off x="153412" y="6364903"/>
+            <a:ext cx="875240" cy="369332"/>
+          </a:xfrm>
+          <a:prstGeom prst="rect">
+            <a:avLst/>
+          </a:prstGeom>
+          <a:noFill/>
+        </p:spPr>
+        <p:txBody>
+          <a:bodyPr wrap="none" rtlCol="0">
+            <a:spAutoFit/>
+          </a:bodyPr>
+          <a:lstStyle/>
+          <a:p>
+            <a:r>
+              <a:rPr lang="de-DE" dirty="0"/>
+              <a:t>Level 3</a:t>
+            </a:r>
+          </a:p>
+        </p:txBody>
+      </p:sp>
+      <p:cxnSp>
+        <p:nvCxnSpPr>
+          <p:cNvPr id="39" name="Gerade Verbindung mit Pfeil 38">
+            <a:extLst>
+              <a:ext uri="{FF2B5EF4-FFF2-40B4-BE49-F238E27FC236}">
+                <a16:creationId xmlns:a16="http://schemas.microsoft.com/office/drawing/2014/main" id="{75BCF5B0-9AC7-97F9-4348-05F6993970BC}"/>
+              </a:ext>
+            </a:extLst>
+          </p:cNvPr>
+          <p:cNvCxnSpPr>
+            <a:cxnSpLocks/>
+          </p:cNvCxnSpPr>
+          <p:nvPr/>
+        </p:nvCxnSpPr>
+        <p:spPr>
+          <a:xfrm>
+            <a:off x="11464908" y="6264284"/>
+            <a:ext cx="414292" cy="0"/>
+          </a:xfrm>
+          <a:prstGeom prst="straightConnector1">
+            <a:avLst/>
+          </a:prstGeom>
+          <a:ln>
+            <a:prstDash val="sysDash"/>
+            <a:tailEnd type="triangle"/>
+          </a:ln>
+        </p:spPr>
+        <p:style>
+          <a:lnRef idx="2">
+            <a:schemeClr val="accent1"/>
+          </a:lnRef>
+          <a:fillRef idx="0">
+            <a:schemeClr val="accent1"/>
+          </a:fillRef>
+          <a:effectRef idx="1">
+            <a:schemeClr val="accent1"/>
+          </a:effectRef>
+          <a:fontRef idx="minor">
+            <a:schemeClr val="tx1"/>
+          </a:fontRef>
+        </p:style>
+      </p:cxnSp>
+      <p:sp>
+        <p:nvSpPr>
+          <p:cNvPr id="41" name="Textfeld 40">
+            <a:extLst>
+              <a:ext uri="{FF2B5EF4-FFF2-40B4-BE49-F238E27FC236}">
+                <a16:creationId xmlns:a16="http://schemas.microsoft.com/office/drawing/2014/main" id="{1D58979F-260F-9643-D037-B5DA035E14FA}"/>
+              </a:ext>
+            </a:extLst>
+          </p:cNvPr>
+          <p:cNvSpPr txBox="1"/>
+          <p:nvPr/>
+        </p:nvSpPr>
+        <p:spPr>
+          <a:xfrm>
+            <a:off x="10856198" y="6093909"/>
+            <a:ext cx="296876" cy="276999"/>
+          </a:xfrm>
+          <a:prstGeom prst="rect">
+            <a:avLst/>
+          </a:prstGeom>
+          <a:noFill/>
+        </p:spPr>
+        <p:txBody>
+          <a:bodyPr wrap="none" rtlCol="0">
+            <a:spAutoFit/>
+          </a:bodyPr>
+          <a:lstStyle/>
+          <a:p>
+            <a:r>
+              <a:rPr lang="de-DE" sz="1200" dirty="0" err="1"/>
+              <a:t>is</a:t>
+            </a:r>
+            <a:endParaRPr lang="de-DE" sz="1200" dirty="0"/>
+          </a:p>
+        </p:txBody>
+      </p:sp>
+      <p:sp>
+        <p:nvSpPr>
+          <p:cNvPr id="49" name="Rechteck 48">
+            <a:extLst>
+              <a:ext uri="{FF2B5EF4-FFF2-40B4-BE49-F238E27FC236}">
+                <a16:creationId xmlns:a16="http://schemas.microsoft.com/office/drawing/2014/main" id="{97883D07-1685-0743-587C-DE5287777711}"/>
+              </a:ext>
+            </a:extLst>
+          </p:cNvPr>
+          <p:cNvSpPr/>
+          <p:nvPr/>
+        </p:nvSpPr>
+        <p:spPr>
+          <a:xfrm>
+            <a:off x="3467462" y="4466334"/>
+            <a:ext cx="1340250" cy="742566"/>
+          </a:xfrm>
+          <a:prstGeom prst="rect">
+            <a:avLst/>
+          </a:prstGeom>
+        </p:spPr>
+        <p:style>
+          <a:lnRef idx="2">
+            <a:schemeClr val="accent1">
+              <a:shade val="15000"/>
+            </a:schemeClr>
+          </a:lnRef>
+          <a:fillRef idx="1">
+            <a:schemeClr val="accent1"/>
+          </a:fillRef>
+          <a:effectRef idx="0">
+            <a:schemeClr val="accent1"/>
+          </a:effectRef>
+          <a:fontRef idx="minor">
+            <a:schemeClr val="lt1"/>
+          </a:fontRef>
+        </p:style>
+        <p:txBody>
+          <a:bodyPr rtlCol="0" anchor="ctr"/>
+          <a:lstStyle/>
+          <a:p>
+            <a:pPr algn="ctr"/>
+            <a:r>
+              <a:rPr lang="de-DE" sz="1200" dirty="0" err="1"/>
+              <a:t>S.R.Consumer</a:t>
+            </a:r>
+            <a:endParaRPr lang="de-DE" sz="1200" dirty="0"/>
+          </a:p>
+        </p:txBody>
+      </p:sp>
+      <p:sp>
+        <p:nvSpPr>
+          <p:cNvPr id="50" name="Rechteck 49">
+            <a:extLst>
+              <a:ext uri="{FF2B5EF4-FFF2-40B4-BE49-F238E27FC236}">
+                <a16:creationId xmlns:a16="http://schemas.microsoft.com/office/drawing/2014/main" id="{22DF0201-4577-0A85-50D6-B1EAF7ED8DE1}"/>
+              </a:ext>
+            </a:extLst>
+          </p:cNvPr>
+          <p:cNvSpPr/>
+          <p:nvPr/>
+        </p:nvSpPr>
+        <p:spPr>
+          <a:xfrm>
+            <a:off x="5296377" y="4466334"/>
+            <a:ext cx="1108978" cy="742566"/>
+          </a:xfrm>
+          <a:prstGeom prst="rect">
+            <a:avLst/>
+          </a:prstGeom>
+        </p:spPr>
+        <p:style>
+          <a:lnRef idx="2">
+            <a:schemeClr val="accent1">
+              <a:shade val="15000"/>
+            </a:schemeClr>
+          </a:lnRef>
+          <a:fillRef idx="1">
+            <a:schemeClr val="accent1"/>
+          </a:fillRef>
+          <a:effectRef idx="0">
+            <a:schemeClr val="accent1"/>
+          </a:effectRef>
+          <a:fontRef idx="minor">
+            <a:schemeClr val="lt1"/>
+          </a:fontRef>
+        </p:style>
+        <p:txBody>
+          <a:bodyPr rtlCol="0" anchor="ctr"/>
+          <a:lstStyle/>
+          <a:p>
+            <a:pPr algn="ctr"/>
+            <a:r>
+              <a:rPr lang="de-DE" sz="1200" dirty="0"/>
+              <a:t>&lt;&lt;interface&gt;&gt;</a:t>
+            </a:r>
+          </a:p>
+          <a:p>
+            <a:pPr algn="ctr"/>
+            <a:r>
+              <a:rPr lang="de-DE" sz="1200" dirty="0" err="1"/>
+              <a:t>S.R.Channel</a:t>
+            </a:r>
+            <a:endParaRPr lang="de-DE" sz="1200" dirty="0"/>
+          </a:p>
+        </p:txBody>
+      </p:sp>
+      <p:cxnSp>
+        <p:nvCxnSpPr>
+          <p:cNvPr id="68" name="Gerade Verbindung mit Pfeil 67">
+            <a:extLst>
+              <a:ext uri="{FF2B5EF4-FFF2-40B4-BE49-F238E27FC236}">
+                <a16:creationId xmlns:a16="http://schemas.microsoft.com/office/drawing/2014/main" id="{2A0C1A5B-0AD6-59DB-5F18-0276C1EB4006}"/>
+              </a:ext>
+            </a:extLst>
+          </p:cNvPr>
+          <p:cNvCxnSpPr>
+            <a:cxnSpLocks/>
+            <a:stCxn id="49" idx="1"/>
+            <a:endCxn id="4" idx="3"/>
+          </p:cNvCxnSpPr>
+          <p:nvPr/>
+        </p:nvCxnSpPr>
+        <p:spPr>
+          <a:xfrm flipH="1">
+            <a:off x="3040743" y="4837617"/>
+            <a:ext cx="426719" cy="0"/>
+          </a:xfrm>
+          <a:prstGeom prst="straightConnector1">
+            <a:avLst/>
+          </a:prstGeom>
+          <a:ln>
+            <a:prstDash val="sysDash"/>
+            <a:tailEnd type="triangle"/>
+          </a:ln>
+        </p:spPr>
+        <p:style>
+          <a:lnRef idx="2">
+            <a:schemeClr val="accent1"/>
+          </a:lnRef>
+          <a:fillRef idx="0">
+            <a:schemeClr val="accent1"/>
+          </a:fillRef>
+          <a:effectRef idx="1">
+            <a:schemeClr val="accent1"/>
+          </a:effectRef>
+          <a:fontRef idx="minor">
+            <a:schemeClr val="tx1"/>
+          </a:fontRef>
+        </p:style>
+      </p:cxnSp>
+      <p:cxnSp>
+        <p:nvCxnSpPr>
+          <p:cNvPr id="69" name="Gerade Verbindung mit Pfeil 68">
+            <a:extLst>
+              <a:ext uri="{FF2B5EF4-FFF2-40B4-BE49-F238E27FC236}">
+                <a16:creationId xmlns:a16="http://schemas.microsoft.com/office/drawing/2014/main" id="{13CF8FF2-AA58-7CB5-1C5E-0F5868F4531D}"/>
+              </a:ext>
+            </a:extLst>
+          </p:cNvPr>
+          <p:cNvCxnSpPr>
+            <a:cxnSpLocks/>
+            <a:stCxn id="49" idx="3"/>
+            <a:endCxn id="50" idx="1"/>
+          </p:cNvCxnSpPr>
+          <p:nvPr/>
+        </p:nvCxnSpPr>
+        <p:spPr>
+          <a:xfrm>
+            <a:off x="4807712" y="4837617"/>
+            <a:ext cx="488665" cy="0"/>
+          </a:xfrm>
+          <a:prstGeom prst="straightConnector1">
+            <a:avLst/>
+          </a:prstGeom>
+          <a:ln>
+            <a:tailEnd type="triangle"/>
+          </a:ln>
+        </p:spPr>
+        <p:style>
+          <a:lnRef idx="2">
+            <a:schemeClr val="accent1"/>
+          </a:lnRef>
+          <a:fillRef idx="0">
+            <a:schemeClr val="accent1"/>
+          </a:fillRef>
+          <a:effectRef idx="1">
+            <a:schemeClr val="accent1"/>
+          </a:effectRef>
+          <a:fontRef idx="minor">
+            <a:schemeClr val="tx1"/>
+          </a:fontRef>
+        </p:style>
+      </p:cxnSp>
+      <p:sp>
+        <p:nvSpPr>
+          <p:cNvPr id="80" name="Rechteck 79">
+            <a:extLst>
+              <a:ext uri="{FF2B5EF4-FFF2-40B4-BE49-F238E27FC236}">
+                <a16:creationId xmlns:a16="http://schemas.microsoft.com/office/drawing/2014/main" id="{D69EBAAE-2917-2186-84D2-F2DDF130C458}"/>
+              </a:ext>
+            </a:extLst>
+          </p:cNvPr>
+          <p:cNvSpPr/>
+          <p:nvPr/>
+        </p:nvSpPr>
+        <p:spPr>
+          <a:xfrm>
+            <a:off x="7157435" y="664728"/>
+            <a:ext cx="1597644" cy="742566"/>
+          </a:xfrm>
+          <a:prstGeom prst="rect">
+            <a:avLst/>
+          </a:prstGeom>
+        </p:spPr>
+        <p:style>
+          <a:lnRef idx="2">
+            <a:schemeClr val="accent1">
+              <a:shade val="15000"/>
+            </a:schemeClr>
+          </a:lnRef>
+          <a:fillRef idx="1">
+            <a:schemeClr val="accent1"/>
+          </a:fillRef>
+          <a:effectRef idx="0">
+            <a:schemeClr val="accent1"/>
+          </a:effectRef>
+          <a:fontRef idx="minor">
+            <a:schemeClr val="lt1"/>
+          </a:fontRef>
+        </p:style>
+        <p:txBody>
+          <a:bodyPr rtlCol="0" anchor="ctr"/>
+          <a:lstStyle/>
+          <a:p>
+            <a:pPr algn="ctr"/>
+            <a:r>
+              <a:rPr lang="de-DE" sz="1200" dirty="0"/>
+              <a:t>&lt;&lt;interface&gt;&gt;</a:t>
+            </a:r>
+          </a:p>
+          <a:p>
+            <a:pPr algn="ctr"/>
+            <a:r>
+              <a:rPr lang="de-DE" sz="1200" dirty="0" err="1"/>
+              <a:t>S.O.Consumer</a:t>
+            </a:r>
+            <a:endParaRPr lang="de-DE" sz="1200" dirty="0"/>
+          </a:p>
+        </p:txBody>
+      </p:sp>
+      <p:sp>
+        <p:nvSpPr>
+          <p:cNvPr id="81" name="Rechteck 80">
+            <a:extLst>
+              <a:ext uri="{FF2B5EF4-FFF2-40B4-BE49-F238E27FC236}">
+                <a16:creationId xmlns:a16="http://schemas.microsoft.com/office/drawing/2014/main" id="{C268A91E-E8CB-E81C-FB2C-7D518273B2DB}"/>
+              </a:ext>
+            </a:extLst>
+          </p:cNvPr>
+          <p:cNvSpPr/>
+          <p:nvPr/>
+        </p:nvSpPr>
+        <p:spPr>
+          <a:xfrm>
+            <a:off x="7157435" y="1763190"/>
+            <a:ext cx="1597644" cy="742566"/>
+          </a:xfrm>
+          <a:prstGeom prst="rect">
+            <a:avLst/>
+          </a:prstGeom>
+        </p:spPr>
+        <p:style>
+          <a:lnRef idx="2">
+            <a:schemeClr val="accent1">
+              <a:shade val="15000"/>
+            </a:schemeClr>
+          </a:lnRef>
+          <a:fillRef idx="1">
+            <a:schemeClr val="accent1"/>
+          </a:fillRef>
+          <a:effectRef idx="0">
+            <a:schemeClr val="accent1"/>
+          </a:effectRef>
+          <a:fontRef idx="minor">
+            <a:schemeClr val="lt1"/>
+          </a:fontRef>
+        </p:style>
+        <p:txBody>
+          <a:bodyPr rtlCol="0" anchor="ctr"/>
+          <a:lstStyle/>
+          <a:p>
+            <a:pPr algn="ctr"/>
+            <a:r>
+              <a:rPr lang="de-DE" sz="1200" dirty="0"/>
+              <a:t>S.O. Consumer</a:t>
+            </a:r>
+          </a:p>
+        </p:txBody>
+      </p:sp>
+      <p:cxnSp>
+        <p:nvCxnSpPr>
+          <p:cNvPr id="82" name="Gerade Verbindung mit Pfeil 81">
+            <a:extLst>
+              <a:ext uri="{FF2B5EF4-FFF2-40B4-BE49-F238E27FC236}">
+                <a16:creationId xmlns:a16="http://schemas.microsoft.com/office/drawing/2014/main" id="{60E01DF8-3FE1-B1A5-EF33-708AAB102A01}"/>
+              </a:ext>
+            </a:extLst>
+          </p:cNvPr>
+          <p:cNvCxnSpPr>
+            <a:cxnSpLocks/>
+            <a:stCxn id="81" idx="0"/>
+            <a:endCxn id="80" idx="2"/>
+          </p:cNvCxnSpPr>
+          <p:nvPr/>
+        </p:nvCxnSpPr>
+        <p:spPr>
+          <a:xfrm flipV="1">
+            <a:off x="7956257" y="1407294"/>
+            <a:ext cx="0" cy="355896"/>
+          </a:xfrm>
+          <a:prstGeom prst="straightConnector1">
+            <a:avLst/>
+          </a:prstGeom>
+          <a:ln>
+            <a:prstDash val="sysDash"/>
+            <a:tailEnd type="triangle"/>
+          </a:ln>
+        </p:spPr>
+        <p:style>
+          <a:lnRef idx="2">
+            <a:schemeClr val="accent1"/>
+          </a:lnRef>
+          <a:fillRef idx="0">
+            <a:schemeClr val="accent1"/>
+          </a:fillRef>
+          <a:effectRef idx="1">
+            <a:schemeClr val="accent1"/>
+          </a:effectRef>
+          <a:fontRef idx="minor">
+            <a:schemeClr val="tx1"/>
+          </a:fontRef>
+        </p:style>
+      </p:cxnSp>
+      <p:sp>
+        <p:nvSpPr>
+          <p:cNvPr id="83" name="Rechteck 82">
+            <a:extLst>
+              <a:ext uri="{FF2B5EF4-FFF2-40B4-BE49-F238E27FC236}">
+                <a16:creationId xmlns:a16="http://schemas.microsoft.com/office/drawing/2014/main" id="{8586CFFB-2E54-C95D-2259-498AC587EBE2}"/>
+              </a:ext>
+            </a:extLst>
+          </p:cNvPr>
+          <p:cNvSpPr/>
+          <p:nvPr/>
+        </p:nvSpPr>
+        <p:spPr>
+          <a:xfrm>
+            <a:off x="9151257" y="1763190"/>
+            <a:ext cx="1154723" cy="742566"/>
+          </a:xfrm>
+          <a:prstGeom prst="rect">
+            <a:avLst/>
+          </a:prstGeom>
+        </p:spPr>
+        <p:style>
+          <a:lnRef idx="2">
+            <a:schemeClr val="accent1">
+              <a:shade val="15000"/>
+            </a:schemeClr>
+          </a:lnRef>
+          <a:fillRef idx="1">
+            <a:schemeClr val="accent1"/>
+          </a:fillRef>
+          <a:effectRef idx="0">
+            <a:schemeClr val="accent1"/>
+          </a:effectRef>
+          <a:fontRef idx="minor">
+            <a:schemeClr val="lt1"/>
+          </a:fontRef>
+        </p:style>
+        <p:txBody>
+          <a:bodyPr rtlCol="0" anchor="ctr"/>
+          <a:lstStyle/>
+          <a:p>
+            <a:pPr algn="ctr"/>
+            <a:r>
+              <a:rPr lang="de-DE" sz="1200" dirty="0"/>
+              <a:t>&lt;&lt;interface&gt;&gt;</a:t>
+            </a:r>
+          </a:p>
+          <a:p>
+            <a:pPr algn="ctr"/>
+            <a:r>
+              <a:rPr lang="de-DE" sz="1200" dirty="0" err="1"/>
+              <a:t>S.O.Writer</a:t>
+            </a:r>
+            <a:endParaRPr lang="de-DE" sz="1200" dirty="0"/>
+          </a:p>
+        </p:txBody>
+      </p:sp>
+      <p:cxnSp>
+        <p:nvCxnSpPr>
+          <p:cNvPr id="84" name="Gerade Verbindung mit Pfeil 83">
+            <a:extLst>
+              <a:ext uri="{FF2B5EF4-FFF2-40B4-BE49-F238E27FC236}">
+                <a16:creationId xmlns:a16="http://schemas.microsoft.com/office/drawing/2014/main" id="{BE83BE05-BA58-772C-5087-3A2107CEA376}"/>
+              </a:ext>
+            </a:extLst>
+          </p:cNvPr>
+          <p:cNvCxnSpPr>
+            <a:cxnSpLocks/>
+            <a:stCxn id="81" idx="3"/>
+            <a:endCxn id="83" idx="1"/>
+          </p:cNvCxnSpPr>
+          <p:nvPr/>
+        </p:nvCxnSpPr>
+        <p:spPr>
+          <a:xfrm>
+            <a:off x="8755079" y="2134473"/>
+            <a:ext cx="396178" cy="0"/>
+          </a:xfrm>
+          <a:prstGeom prst="straightConnector1">
+            <a:avLst/>
+          </a:prstGeom>
+          <a:ln>
+            <a:solidFill>
+              <a:schemeClr val="tx1"/>
+            </a:solidFill>
+            <a:tailEnd type="triangle"/>
+          </a:ln>
+        </p:spPr>
+        <p:style>
+          <a:lnRef idx="2">
+            <a:schemeClr val="accent1"/>
+          </a:lnRef>
+          <a:fillRef idx="0">
+            <a:schemeClr val="accent1"/>
+          </a:fillRef>
+          <a:effectRef idx="1">
+            <a:schemeClr val="accent1"/>
+          </a:effectRef>
+          <a:fontRef idx="minor">
+            <a:schemeClr val="tx1"/>
+          </a:fontRef>
+        </p:style>
+      </p:cxnSp>
+      <p:cxnSp>
+        <p:nvCxnSpPr>
+          <p:cNvPr id="86" name="Gerade Verbindung mit Pfeil 85">
+            <a:extLst>
+              <a:ext uri="{FF2B5EF4-FFF2-40B4-BE49-F238E27FC236}">
+                <a16:creationId xmlns:a16="http://schemas.microsoft.com/office/drawing/2014/main" id="{CCE951A8-D9C2-84C6-495A-178BE1747462}"/>
+              </a:ext>
+            </a:extLst>
+          </p:cNvPr>
+          <p:cNvCxnSpPr>
+            <a:cxnSpLocks/>
+            <a:stCxn id="81" idx="1"/>
+            <a:endCxn id="21" idx="3"/>
+          </p:cNvCxnSpPr>
+          <p:nvPr/>
+        </p:nvCxnSpPr>
+        <p:spPr>
+          <a:xfrm flipH="1">
+            <a:off x="6405355" y="2134473"/>
+            <a:ext cx="752080" cy="0"/>
+          </a:xfrm>
+          <a:prstGeom prst="straightConnector1">
+            <a:avLst/>
+          </a:prstGeom>
+          <a:ln>
+            <a:solidFill>
+              <a:schemeClr val="tx1"/>
+            </a:solidFill>
+            <a:tailEnd type="triangle"/>
+          </a:ln>
+        </p:spPr>
+        <p:style>
+          <a:lnRef idx="2">
+            <a:schemeClr val="accent1"/>
+          </a:lnRef>
+          <a:fillRef idx="0">
+            <a:schemeClr val="accent1"/>
+          </a:fillRef>
+          <a:effectRef idx="1">
+            <a:schemeClr val="accent1"/>
+          </a:effectRef>
+          <a:fontRef idx="minor">
+            <a:schemeClr val="tx1"/>
+          </a:fontRef>
+        </p:style>
+      </p:cxnSp>
+      <p:sp>
+        <p:nvSpPr>
+          <p:cNvPr id="87" name="Rechteck 86">
+            <a:extLst>
+              <a:ext uri="{FF2B5EF4-FFF2-40B4-BE49-F238E27FC236}">
+                <a16:creationId xmlns:a16="http://schemas.microsoft.com/office/drawing/2014/main" id="{05BA88B8-D576-5A8C-9174-1CF5B3011241}"/>
+              </a:ext>
+            </a:extLst>
+          </p:cNvPr>
+          <p:cNvSpPr/>
+          <p:nvPr/>
+        </p:nvSpPr>
+        <p:spPr>
+          <a:xfrm>
+            <a:off x="7157435" y="2837557"/>
+            <a:ext cx="1597644" cy="742566"/>
+          </a:xfrm>
+          <a:prstGeom prst="rect">
+            <a:avLst/>
+          </a:prstGeom>
+        </p:spPr>
+        <p:style>
+          <a:lnRef idx="2">
+            <a:schemeClr val="accent1">
+              <a:shade val="15000"/>
+            </a:schemeClr>
+          </a:lnRef>
+          <a:fillRef idx="1">
+            <a:schemeClr val="accent1"/>
+          </a:fillRef>
+          <a:effectRef idx="0">
+            <a:schemeClr val="accent1"/>
+          </a:effectRef>
+          <a:fontRef idx="minor">
+            <a:schemeClr val="lt1"/>
+          </a:fontRef>
+        </p:style>
+        <p:txBody>
+          <a:bodyPr rtlCol="0" anchor="ctr"/>
+          <a:lstStyle/>
+          <a:p>
+            <a:pPr algn="ctr"/>
+            <a:r>
+              <a:rPr lang="de-DE" sz="1200" dirty="0"/>
+              <a:t>Animation </a:t>
+            </a:r>
+            <a:r>
+              <a:rPr lang="de-DE" sz="1200" dirty="0" err="1"/>
+              <a:t>GroupState</a:t>
+            </a:r>
+            <a:endParaRPr lang="de-DE" sz="1200" dirty="0"/>
+          </a:p>
+        </p:txBody>
+      </p:sp>
+      <p:cxnSp>
+        <p:nvCxnSpPr>
+          <p:cNvPr id="88" name="Gerade Verbindung mit Pfeil 87">
+            <a:extLst>
+              <a:ext uri="{FF2B5EF4-FFF2-40B4-BE49-F238E27FC236}">
+                <a16:creationId xmlns:a16="http://schemas.microsoft.com/office/drawing/2014/main" id="{723A5C37-9D6D-ED3C-CFAB-9D3DE315BA03}"/>
+              </a:ext>
+            </a:extLst>
+          </p:cNvPr>
+          <p:cNvCxnSpPr>
+            <a:cxnSpLocks/>
+            <a:stCxn id="81" idx="2"/>
+            <a:endCxn id="87" idx="0"/>
+          </p:cNvCxnSpPr>
+          <p:nvPr/>
+        </p:nvCxnSpPr>
+        <p:spPr>
+          <a:xfrm>
+            <a:off x="7956257" y="2505756"/>
+            <a:ext cx="0" cy="331801"/>
+          </a:xfrm>
+          <a:prstGeom prst="straightConnector1">
+            <a:avLst/>
+          </a:prstGeom>
+          <a:ln>
+            <a:solidFill>
+              <a:schemeClr val="tx1"/>
+            </a:solidFill>
+            <a:tailEnd type="triangle"/>
+          </a:ln>
+        </p:spPr>
+        <p:style>
+          <a:lnRef idx="2">
+            <a:schemeClr val="accent1"/>
+          </a:lnRef>
+          <a:fillRef idx="0">
+            <a:schemeClr val="accent1"/>
+          </a:fillRef>
+          <a:effectRef idx="1">
+            <a:schemeClr val="accent1"/>
+          </a:effectRef>
+          <a:fontRef idx="minor">
+            <a:schemeClr val="tx1"/>
+          </a:fontRef>
+        </p:style>
+      </p:cxnSp>
+      <p:sp>
+        <p:nvSpPr>
+          <p:cNvPr id="89" name="Rechteck 88">
+            <a:extLst>
+              <a:ext uri="{FF2B5EF4-FFF2-40B4-BE49-F238E27FC236}">
+                <a16:creationId xmlns:a16="http://schemas.microsoft.com/office/drawing/2014/main" id="{A870C3D4-E836-F428-3DBD-5C3F403A1CC3}"/>
+              </a:ext>
+            </a:extLst>
+          </p:cNvPr>
+          <p:cNvSpPr/>
+          <p:nvPr/>
+        </p:nvSpPr>
+        <p:spPr>
+          <a:xfrm>
+            <a:off x="10666086" y="1763768"/>
+            <a:ext cx="1213112" cy="742566"/>
+          </a:xfrm>
+          <a:prstGeom prst="rect">
+            <a:avLst/>
+          </a:prstGeom>
+        </p:spPr>
+        <p:style>
+          <a:lnRef idx="2">
+            <a:schemeClr val="accent1">
+              <a:shade val="15000"/>
+            </a:schemeClr>
+          </a:lnRef>
+          <a:fillRef idx="1">
+            <a:schemeClr val="accent1"/>
+          </a:fillRef>
+          <a:effectRef idx="0">
+            <a:schemeClr val="accent1"/>
+          </a:effectRef>
+          <a:fontRef idx="minor">
+            <a:schemeClr val="lt1"/>
+          </a:fontRef>
+        </p:style>
+        <p:txBody>
+          <a:bodyPr rtlCol="0" anchor="ctr"/>
+          <a:lstStyle/>
+          <a:p>
+            <a:pPr algn="ctr"/>
+            <a:r>
+              <a:rPr lang="de-DE" sz="1200" dirty="0" err="1"/>
+              <a:t>WpfS.O.Writer</a:t>
+            </a:r>
+            <a:endParaRPr lang="de-DE" sz="1200" dirty="0"/>
+          </a:p>
+        </p:txBody>
+      </p:sp>
+      <p:cxnSp>
+        <p:nvCxnSpPr>
+          <p:cNvPr id="90" name="Gerade Verbindung mit Pfeil 89">
+            <a:extLst>
+              <a:ext uri="{FF2B5EF4-FFF2-40B4-BE49-F238E27FC236}">
+                <a16:creationId xmlns:a16="http://schemas.microsoft.com/office/drawing/2014/main" id="{A053DF29-55B5-2919-8810-330B391BCD64}"/>
+              </a:ext>
+            </a:extLst>
+          </p:cNvPr>
+          <p:cNvCxnSpPr>
+            <a:cxnSpLocks/>
+            <a:stCxn id="89" idx="1"/>
+            <a:endCxn id="83" idx="3"/>
+          </p:cNvCxnSpPr>
+          <p:nvPr/>
+        </p:nvCxnSpPr>
+        <p:spPr>
+          <a:xfrm flipH="1" flipV="1">
+            <a:off x="10305980" y="2134473"/>
+            <a:ext cx="360106" cy="578"/>
+          </a:xfrm>
+          <a:prstGeom prst="straightConnector1">
+            <a:avLst/>
+          </a:prstGeom>
+          <a:ln>
+            <a:prstDash val="sysDash"/>
+            <a:tailEnd type="triangle"/>
+          </a:ln>
+        </p:spPr>
+        <p:style>
+          <a:lnRef idx="2">
+            <a:schemeClr val="accent1"/>
+          </a:lnRef>
+          <a:fillRef idx="0">
+            <a:schemeClr val="accent1"/>
+          </a:fillRef>
+          <a:effectRef idx="1">
+            <a:schemeClr val="accent1"/>
+          </a:effectRef>
+          <a:fontRef idx="minor">
+            <a:schemeClr val="tx1"/>
+          </a:fontRef>
+        </p:style>
+      </p:cxnSp>
+      <p:cxnSp>
+        <p:nvCxnSpPr>
+          <p:cNvPr id="91" name="Gerade Verbindung mit Pfeil 90">
+            <a:extLst>
+              <a:ext uri="{FF2B5EF4-FFF2-40B4-BE49-F238E27FC236}">
+                <a16:creationId xmlns:a16="http://schemas.microsoft.com/office/drawing/2014/main" id="{1EBF7524-89BF-6F89-FDFF-51BB0B579770}"/>
+              </a:ext>
+            </a:extLst>
+          </p:cNvPr>
+          <p:cNvCxnSpPr>
+            <a:cxnSpLocks/>
+            <a:stCxn id="89" idx="2"/>
+            <a:endCxn id="92" idx="0"/>
+          </p:cNvCxnSpPr>
+          <p:nvPr/>
+        </p:nvCxnSpPr>
+        <p:spPr>
+          <a:xfrm>
+            <a:off x="11272642" y="2506334"/>
+            <a:ext cx="0" cy="1960000"/>
+          </a:xfrm>
+          <a:prstGeom prst="straightConnector1">
+            <a:avLst/>
+          </a:prstGeom>
+          <a:ln>
+            <a:solidFill>
+              <a:schemeClr val="tx1"/>
+            </a:solidFill>
+            <a:tailEnd type="triangle"/>
+          </a:ln>
+        </p:spPr>
+        <p:style>
+          <a:lnRef idx="2">
+            <a:schemeClr val="accent1"/>
+          </a:lnRef>
+          <a:fillRef idx="0">
+            <a:schemeClr val="accent1"/>
+          </a:fillRef>
+          <a:effectRef idx="1">
+            <a:schemeClr val="accent1"/>
+          </a:effectRef>
+          <a:fontRef idx="minor">
+            <a:schemeClr val="tx1"/>
+          </a:fontRef>
+        </p:style>
+      </p:cxnSp>
+      <p:sp>
+        <p:nvSpPr>
+          <p:cNvPr id="92" name="Rechteck 91">
+            <a:extLst>
+              <a:ext uri="{FF2B5EF4-FFF2-40B4-BE49-F238E27FC236}">
+                <a16:creationId xmlns:a16="http://schemas.microsoft.com/office/drawing/2014/main" id="{3F4881A6-E880-B048-C2ED-43317795DE17}"/>
+              </a:ext>
+            </a:extLst>
+          </p:cNvPr>
+          <p:cNvSpPr/>
+          <p:nvPr/>
+        </p:nvSpPr>
+        <p:spPr>
+          <a:xfrm>
+            <a:off x="10666086" y="4466334"/>
+            <a:ext cx="1213112" cy="742566"/>
+          </a:xfrm>
+          <a:prstGeom prst="rect">
+            <a:avLst/>
+          </a:prstGeom>
+        </p:spPr>
+        <p:style>
+          <a:lnRef idx="2">
+            <a:schemeClr val="accent1">
+              <a:shade val="15000"/>
+            </a:schemeClr>
+          </a:lnRef>
+          <a:fillRef idx="1">
+            <a:schemeClr val="accent1"/>
+          </a:fillRef>
+          <a:effectRef idx="0">
+            <a:schemeClr val="accent1"/>
+          </a:effectRef>
+          <a:fontRef idx="minor">
+            <a:schemeClr val="lt1"/>
+          </a:fontRef>
+        </p:style>
+        <p:txBody>
+          <a:bodyPr rtlCol="0" anchor="ctr"/>
+          <a:lstStyle/>
+          <a:p>
+            <a:pPr algn="ctr"/>
+            <a:r>
+              <a:rPr lang="de-DE" sz="1200" dirty="0"/>
+              <a:t>&lt;&lt;interface&gt;&gt;</a:t>
+            </a:r>
+          </a:p>
+          <a:p>
+            <a:pPr algn="ctr"/>
+            <a:r>
+              <a:rPr lang="de-DE" sz="1200" dirty="0" err="1"/>
+              <a:t>S.R.Producer</a:t>
+            </a:r>
+            <a:endParaRPr lang="de-DE" sz="1200" dirty="0"/>
+          </a:p>
+        </p:txBody>
+      </p:sp>
+      <p:sp>
+        <p:nvSpPr>
+          <p:cNvPr id="93" name="Rechteck 92">
+            <a:extLst>
+              <a:ext uri="{FF2B5EF4-FFF2-40B4-BE49-F238E27FC236}">
+                <a16:creationId xmlns:a16="http://schemas.microsoft.com/office/drawing/2014/main" id="{478C2220-84D8-B176-D6EA-0B10F072B2D6}"/>
+              </a:ext>
+            </a:extLst>
+          </p:cNvPr>
+          <p:cNvSpPr/>
+          <p:nvPr/>
+        </p:nvSpPr>
+        <p:spPr>
+          <a:xfrm>
+            <a:off x="7157435" y="4466334"/>
+            <a:ext cx="1597644" cy="742566"/>
+          </a:xfrm>
+          <a:prstGeom prst="rect">
+            <a:avLst/>
+          </a:prstGeom>
+        </p:spPr>
+        <p:style>
+          <a:lnRef idx="2">
+            <a:schemeClr val="accent1">
+              <a:shade val="15000"/>
+            </a:schemeClr>
+          </a:lnRef>
+          <a:fillRef idx="1">
+            <a:schemeClr val="accent1"/>
+          </a:fillRef>
+          <a:effectRef idx="0">
+            <a:schemeClr val="accent1"/>
+          </a:effectRef>
+          <a:fontRef idx="minor">
+            <a:schemeClr val="lt1"/>
+          </a:fontRef>
+        </p:style>
+        <p:txBody>
+          <a:bodyPr rtlCol="0" anchor="ctr"/>
+          <a:lstStyle/>
+          <a:p>
+            <a:pPr algn="ctr"/>
+            <a:r>
+              <a:rPr lang="de-DE" sz="1200" dirty="0" err="1"/>
+              <a:t>S.R.Producer</a:t>
+            </a:r>
+            <a:endParaRPr lang="de-DE" sz="1200" dirty="0"/>
+          </a:p>
+        </p:txBody>
+      </p:sp>
+      <p:cxnSp>
+        <p:nvCxnSpPr>
+          <p:cNvPr id="94" name="Gerade Verbindung mit Pfeil 93">
+            <a:extLst>
+              <a:ext uri="{FF2B5EF4-FFF2-40B4-BE49-F238E27FC236}">
+                <a16:creationId xmlns:a16="http://schemas.microsoft.com/office/drawing/2014/main" id="{088B5F3C-035F-07AB-B264-A18CFC050D78}"/>
+              </a:ext>
+            </a:extLst>
+          </p:cNvPr>
+          <p:cNvCxnSpPr>
+            <a:cxnSpLocks/>
+            <a:stCxn id="93" idx="3"/>
+            <a:endCxn id="92" idx="1"/>
+          </p:cNvCxnSpPr>
+          <p:nvPr/>
+        </p:nvCxnSpPr>
+        <p:spPr>
+          <a:xfrm>
+            <a:off x="8755079" y="4837617"/>
+            <a:ext cx="1911007" cy="0"/>
+          </a:xfrm>
+          <a:prstGeom prst="straightConnector1">
+            <a:avLst/>
+          </a:prstGeom>
+          <a:ln>
+            <a:prstDash val="sysDash"/>
+            <a:tailEnd type="triangle"/>
+          </a:ln>
+        </p:spPr>
+        <p:style>
+          <a:lnRef idx="2">
+            <a:schemeClr val="accent1"/>
+          </a:lnRef>
+          <a:fillRef idx="0">
+            <a:schemeClr val="accent1"/>
+          </a:fillRef>
+          <a:effectRef idx="1">
+            <a:schemeClr val="accent1"/>
+          </a:effectRef>
+          <a:fontRef idx="minor">
+            <a:schemeClr val="tx1"/>
+          </a:fontRef>
+        </p:style>
+      </p:cxnSp>
+      <p:cxnSp>
+        <p:nvCxnSpPr>
+          <p:cNvPr id="96" name="Gerade Verbindung mit Pfeil 95">
+            <a:extLst>
+              <a:ext uri="{FF2B5EF4-FFF2-40B4-BE49-F238E27FC236}">
+                <a16:creationId xmlns:a16="http://schemas.microsoft.com/office/drawing/2014/main" id="{BA2DFF14-7810-6288-C997-25069050D9F6}"/>
+              </a:ext>
+            </a:extLst>
+          </p:cNvPr>
+          <p:cNvCxnSpPr>
+            <a:cxnSpLocks/>
+            <a:stCxn id="93" idx="1"/>
+            <a:endCxn id="50" idx="3"/>
+          </p:cNvCxnSpPr>
+          <p:nvPr/>
+        </p:nvCxnSpPr>
+        <p:spPr>
+          <a:xfrm flipH="1">
+            <a:off x="6405355" y="4837617"/>
+            <a:ext cx="752080" cy="0"/>
+          </a:xfrm>
+          <a:prstGeom prst="straightConnector1">
+            <a:avLst/>
+          </a:prstGeom>
+          <a:ln>
+            <a:solidFill>
+              <a:schemeClr val="tx1"/>
+            </a:solidFill>
+            <a:tailEnd type="triangle"/>
+          </a:ln>
+        </p:spPr>
+        <p:style>
+          <a:lnRef idx="2">
+            <a:schemeClr val="accent1"/>
+          </a:lnRef>
+          <a:fillRef idx="0">
+            <a:schemeClr val="accent1"/>
+          </a:fillRef>
+          <a:effectRef idx="1">
+            <a:schemeClr val="accent1"/>
+          </a:effectRef>
+          <a:fontRef idx="minor">
+            <a:schemeClr val="tx1"/>
+          </a:fontRef>
+        </p:style>
+      </p:cxnSp>
+      <p:sp>
+        <p:nvSpPr>
+          <p:cNvPr id="161" name="Textfeld 160">
+            <a:extLst>
+              <a:ext uri="{FF2B5EF4-FFF2-40B4-BE49-F238E27FC236}">
+                <a16:creationId xmlns:a16="http://schemas.microsoft.com/office/drawing/2014/main" id="{2501BB27-A696-290B-1223-2AFD57485581}"/>
+              </a:ext>
+            </a:extLst>
+          </p:cNvPr>
+          <p:cNvSpPr txBox="1"/>
+          <p:nvPr/>
+        </p:nvSpPr>
+        <p:spPr>
+          <a:xfrm>
+            <a:off x="4526359" y="5580183"/>
+            <a:ext cx="1513619" cy="461665"/>
+          </a:xfrm>
+          <a:prstGeom prst="rect">
+            <a:avLst/>
+          </a:prstGeom>
+          <a:noFill/>
+        </p:spPr>
+        <p:txBody>
+          <a:bodyPr wrap="none" rtlCol="0">
+            <a:spAutoFit/>
+          </a:bodyPr>
+          <a:lstStyle/>
+          <a:p>
+            <a:r>
+              <a:rPr lang="de-DE" sz="1200" dirty="0"/>
+              <a:t>S.O. = </a:t>
+            </a:r>
+            <a:r>
+              <a:rPr lang="de-DE" sz="1200" dirty="0" err="1"/>
+              <a:t>ScreenObject</a:t>
+            </a:r>
+            <a:endParaRPr lang="de-DE" sz="1200" dirty="0"/>
+          </a:p>
+          <a:p>
+            <a:r>
+              <a:rPr lang="de-DE" sz="1200" dirty="0"/>
+              <a:t>S.R. = </a:t>
+            </a:r>
+            <a:r>
+              <a:rPr lang="de-DE" sz="1200" dirty="0" err="1"/>
+              <a:t>ScreenResult</a:t>
+            </a:r>
+            <a:endParaRPr lang="de-DE" sz="1200" dirty="0"/>
+          </a:p>
+        </p:txBody>
+      </p:sp>
+      <p:sp>
+        <p:nvSpPr>
+          <p:cNvPr id="170" name="Rechteck 169">
+            <a:extLst>
+              <a:ext uri="{FF2B5EF4-FFF2-40B4-BE49-F238E27FC236}">
+                <a16:creationId xmlns:a16="http://schemas.microsoft.com/office/drawing/2014/main" id="{B3EC8B92-AA9C-E47E-F1E1-DF5AF2FA6BC8}"/>
+              </a:ext>
+            </a:extLst>
+          </p:cNvPr>
+          <p:cNvSpPr/>
+          <p:nvPr/>
+        </p:nvSpPr>
+        <p:spPr>
+          <a:xfrm>
+            <a:off x="2738195" y="470427"/>
+            <a:ext cx="1399392" cy="625392"/>
+          </a:xfrm>
+          <a:prstGeom prst="rect">
+            <a:avLst/>
+          </a:prstGeom>
+        </p:spPr>
+        <p:style>
+          <a:lnRef idx="2">
+            <a:schemeClr val="accent1">
+              <a:shade val="15000"/>
+            </a:schemeClr>
+          </a:lnRef>
+          <a:fillRef idx="1">
+            <a:schemeClr val="accent1"/>
+          </a:fillRef>
+          <a:effectRef idx="0">
+            <a:schemeClr val="accent1"/>
+          </a:effectRef>
+          <a:fontRef idx="minor">
+            <a:schemeClr val="lt1"/>
+          </a:fontRef>
+        </p:style>
+        <p:txBody>
+          <a:bodyPr rtlCol="0" anchor="ctr"/>
+          <a:lstStyle/>
+          <a:p>
+            <a:pPr algn="ctr"/>
+            <a:r>
+              <a:rPr lang="de-DE" sz="1200" dirty="0"/>
+              <a:t>Communication</a:t>
+            </a:r>
+            <a:br>
+              <a:rPr lang="de-DE" sz="1200" dirty="0"/>
+            </a:br>
+            <a:r>
+              <a:rPr lang="de-DE" sz="1200" dirty="0"/>
+              <a:t>Broker</a:t>
+            </a:r>
+          </a:p>
+        </p:txBody>
+      </p:sp>
+      <p:cxnSp>
+        <p:nvCxnSpPr>
+          <p:cNvPr id="174" name="Verbinder: gekrümmt 173">
+            <a:extLst>
+              <a:ext uri="{FF2B5EF4-FFF2-40B4-BE49-F238E27FC236}">
+                <a16:creationId xmlns:a16="http://schemas.microsoft.com/office/drawing/2014/main" id="{4331EE9E-F5B3-9ED4-E1DB-9EAD543E2293}"/>
+              </a:ext>
+            </a:extLst>
+          </p:cNvPr>
+          <p:cNvCxnSpPr>
+            <a:cxnSpLocks/>
+            <a:stCxn id="170" idx="3"/>
+            <a:endCxn id="21" idx="0"/>
+          </p:cNvCxnSpPr>
+          <p:nvPr/>
+        </p:nvCxnSpPr>
+        <p:spPr>
+          <a:xfrm>
+            <a:off x="4137587" y="783123"/>
+            <a:ext cx="1713280" cy="980067"/>
+          </a:xfrm>
+          <a:prstGeom prst="curvedConnector2">
+            <a:avLst/>
+          </a:prstGeom>
+          <a:ln>
+            <a:prstDash val="sysDot"/>
+            <a:tailEnd type="triangle"/>
+          </a:ln>
+        </p:spPr>
+        <p:style>
+          <a:lnRef idx="2">
+            <a:schemeClr val="accent5"/>
+          </a:lnRef>
+          <a:fillRef idx="0">
+            <a:schemeClr val="accent5"/>
+          </a:fillRef>
+          <a:effectRef idx="1">
+            <a:schemeClr val="accent5"/>
+          </a:effectRef>
+          <a:fontRef idx="minor">
+            <a:schemeClr val="tx1"/>
+          </a:fontRef>
+        </p:style>
+      </p:cxnSp>
+      <p:cxnSp>
+        <p:nvCxnSpPr>
+          <p:cNvPr id="194" name="Verbinder: gekrümmt 193">
+            <a:extLst>
+              <a:ext uri="{FF2B5EF4-FFF2-40B4-BE49-F238E27FC236}">
+                <a16:creationId xmlns:a16="http://schemas.microsoft.com/office/drawing/2014/main" id="{F6BA122B-757D-4569-1E50-309D9FE89A43}"/>
+              </a:ext>
+            </a:extLst>
+          </p:cNvPr>
+          <p:cNvCxnSpPr>
+            <a:cxnSpLocks/>
+            <a:stCxn id="170" idx="3"/>
+            <a:endCxn id="80" idx="0"/>
+          </p:cNvCxnSpPr>
+          <p:nvPr/>
+        </p:nvCxnSpPr>
+        <p:spPr>
+          <a:xfrm flipV="1">
+            <a:off x="4137587" y="664728"/>
+            <a:ext cx="3818670" cy="118395"/>
+          </a:xfrm>
+          <a:prstGeom prst="curvedConnector4">
+            <a:avLst>
+              <a:gd name="adj1" fmla="val 39541"/>
+              <a:gd name="adj2" fmla="val 457195"/>
+            </a:avLst>
+          </a:prstGeom>
+          <a:ln>
+            <a:prstDash val="sysDot"/>
+            <a:tailEnd type="triangle"/>
+          </a:ln>
+        </p:spPr>
+        <p:style>
+          <a:lnRef idx="2">
+            <a:schemeClr val="accent5"/>
+          </a:lnRef>
+          <a:fillRef idx="0">
+            <a:schemeClr val="accent5"/>
+          </a:fillRef>
+          <a:effectRef idx="1">
+            <a:schemeClr val="accent5"/>
+          </a:effectRef>
+          <a:fontRef idx="minor">
+            <a:schemeClr val="tx1"/>
+          </a:fontRef>
+        </p:style>
+      </p:cxnSp>
+      <p:cxnSp>
+        <p:nvCxnSpPr>
+          <p:cNvPr id="197" name="Gerade Verbindung mit Pfeil 196">
+            <a:extLst>
+              <a:ext uri="{FF2B5EF4-FFF2-40B4-BE49-F238E27FC236}">
+                <a16:creationId xmlns:a16="http://schemas.microsoft.com/office/drawing/2014/main" id="{716DC2BB-C987-43F2-AF9E-551BA6E78613}"/>
+              </a:ext>
+            </a:extLst>
+          </p:cNvPr>
+          <p:cNvCxnSpPr>
+            <a:cxnSpLocks/>
+          </p:cNvCxnSpPr>
+          <p:nvPr/>
+        </p:nvCxnSpPr>
+        <p:spPr>
+          <a:xfrm>
+            <a:off x="11464908" y="6535956"/>
+            <a:ext cx="414292" cy="0"/>
+          </a:xfrm>
+          <a:prstGeom prst="straightConnector1">
+            <a:avLst/>
+          </a:prstGeom>
+          <a:ln>
+            <a:solidFill>
+              <a:schemeClr val="accent5"/>
+            </a:solidFill>
+            <a:prstDash val="sysDot"/>
+            <a:tailEnd type="triangle"/>
+          </a:ln>
+        </p:spPr>
+        <p:style>
+          <a:lnRef idx="2">
+            <a:schemeClr val="accent1"/>
+          </a:lnRef>
+          <a:fillRef idx="0">
+            <a:schemeClr val="accent1"/>
+          </a:fillRef>
+          <a:effectRef idx="1">
+            <a:schemeClr val="accent1"/>
+          </a:effectRef>
+          <a:fontRef idx="minor">
+            <a:schemeClr val="tx1"/>
+          </a:fontRef>
+        </p:style>
+      </p:cxnSp>
+      <p:sp>
+        <p:nvSpPr>
+          <p:cNvPr id="198" name="Textfeld 197">
+            <a:extLst>
+              <a:ext uri="{FF2B5EF4-FFF2-40B4-BE49-F238E27FC236}">
+                <a16:creationId xmlns:a16="http://schemas.microsoft.com/office/drawing/2014/main" id="{F152F075-4469-D339-2592-C9D2858C619B}"/>
+              </a:ext>
+            </a:extLst>
+          </p:cNvPr>
+          <p:cNvSpPr txBox="1"/>
+          <p:nvPr/>
+        </p:nvSpPr>
+        <p:spPr>
+          <a:xfrm>
+            <a:off x="10849657" y="6364903"/>
+            <a:ext cx="606833" cy="276999"/>
+          </a:xfrm>
+          <a:prstGeom prst="rect">
+            <a:avLst/>
+          </a:prstGeom>
+          <a:noFill/>
+        </p:spPr>
+        <p:txBody>
+          <a:bodyPr wrap="none" rtlCol="0">
+            <a:spAutoFit/>
+          </a:bodyPr>
+          <a:lstStyle/>
+          <a:p>
+            <a:r>
+              <a:rPr lang="de-DE" sz="1200" dirty="0" err="1"/>
+              <a:t>create</a:t>
+            </a:r>
+            <a:endParaRPr lang="de-DE" sz="1200" dirty="0"/>
+          </a:p>
+        </p:txBody>
+      </p:sp>
+      <p:sp>
+        <p:nvSpPr>
+          <p:cNvPr id="199" name="Rechteck 198">
+            <a:extLst>
+              <a:ext uri="{FF2B5EF4-FFF2-40B4-BE49-F238E27FC236}">
+                <a16:creationId xmlns:a16="http://schemas.microsoft.com/office/drawing/2014/main" id="{31018D7A-BC9F-10E3-B360-899CD84F71B3}"/>
+              </a:ext>
+            </a:extLst>
+          </p:cNvPr>
+          <p:cNvSpPr/>
+          <p:nvPr/>
+        </p:nvSpPr>
+        <p:spPr>
+          <a:xfrm>
+            <a:off x="191298" y="122385"/>
+            <a:ext cx="1434759" cy="542343"/>
+          </a:xfrm>
+          <a:prstGeom prst="rect">
+            <a:avLst/>
+          </a:prstGeom>
+        </p:spPr>
+        <p:style>
+          <a:lnRef idx="2">
+            <a:schemeClr val="accent1">
+              <a:shade val="15000"/>
+            </a:schemeClr>
+          </a:lnRef>
+          <a:fillRef idx="1">
+            <a:schemeClr val="accent1"/>
+          </a:fillRef>
+          <a:effectRef idx="0">
+            <a:schemeClr val="accent1"/>
+          </a:effectRef>
+          <a:fontRef idx="minor">
+            <a:schemeClr val="lt1"/>
+          </a:fontRef>
+        </p:style>
+        <p:txBody>
+          <a:bodyPr rtlCol="0" anchor="ctr"/>
+          <a:lstStyle/>
+          <a:p>
+            <a:pPr algn="ctr"/>
+            <a:r>
+              <a:rPr lang="de-DE" sz="1200" dirty="0"/>
+              <a:t>Communication</a:t>
+            </a:r>
+            <a:br>
+              <a:rPr lang="de-DE" sz="1200" dirty="0"/>
+            </a:br>
+            <a:endParaRPr lang="de-DE" sz="1200" dirty="0"/>
+          </a:p>
+        </p:txBody>
+      </p:sp>
+      <p:cxnSp>
+        <p:nvCxnSpPr>
+          <p:cNvPr id="203" name="Verbinder: gekrümmt 202">
+            <a:extLst>
+              <a:ext uri="{FF2B5EF4-FFF2-40B4-BE49-F238E27FC236}">
+                <a16:creationId xmlns:a16="http://schemas.microsoft.com/office/drawing/2014/main" id="{62BEA821-F808-312D-A405-4487428AF591}"/>
+              </a:ext>
+            </a:extLst>
+          </p:cNvPr>
+          <p:cNvCxnSpPr>
+            <a:cxnSpLocks/>
+            <a:stCxn id="199" idx="3"/>
+            <a:endCxn id="4" idx="0"/>
+          </p:cNvCxnSpPr>
+          <p:nvPr/>
+        </p:nvCxnSpPr>
+        <p:spPr>
+          <a:xfrm>
+            <a:off x="1626057" y="393557"/>
+            <a:ext cx="777611" cy="4072777"/>
+          </a:xfrm>
+          <a:prstGeom prst="curvedConnector2">
+            <a:avLst/>
+          </a:prstGeom>
+          <a:ln>
+            <a:prstDash val="sysDot"/>
+            <a:tailEnd type="triangle"/>
+          </a:ln>
+        </p:spPr>
+        <p:style>
+          <a:lnRef idx="2">
+            <a:schemeClr val="accent5"/>
+          </a:lnRef>
+          <a:fillRef idx="0">
+            <a:schemeClr val="accent5"/>
+          </a:fillRef>
+          <a:effectRef idx="1">
+            <a:schemeClr val="accent5"/>
+          </a:effectRef>
+          <a:fontRef idx="minor">
+            <a:schemeClr val="tx1"/>
+          </a:fontRef>
+        </p:style>
+      </p:cxnSp>
+      <p:sp>
+        <p:nvSpPr>
+          <p:cNvPr id="232" name="Rechteck 231">
+            <a:extLst>
+              <a:ext uri="{FF2B5EF4-FFF2-40B4-BE49-F238E27FC236}">
+                <a16:creationId xmlns:a16="http://schemas.microsoft.com/office/drawing/2014/main" id="{55524D31-69BB-C15F-6452-AC29F5E30D57}"/>
+              </a:ext>
+            </a:extLst>
+          </p:cNvPr>
+          <p:cNvSpPr/>
+          <p:nvPr/>
+        </p:nvSpPr>
+        <p:spPr>
+          <a:xfrm>
+            <a:off x="10704467" y="115809"/>
+            <a:ext cx="1351346" cy="742566"/>
+          </a:xfrm>
+          <a:prstGeom prst="rect">
+            <a:avLst/>
+          </a:prstGeom>
+        </p:spPr>
+        <p:style>
+          <a:lnRef idx="2">
+            <a:schemeClr val="accent1">
+              <a:shade val="15000"/>
+            </a:schemeClr>
+          </a:lnRef>
+          <a:fillRef idx="1">
+            <a:schemeClr val="accent1"/>
+          </a:fillRef>
+          <a:effectRef idx="0">
+            <a:schemeClr val="accent1"/>
+          </a:effectRef>
+          <a:fontRef idx="minor">
+            <a:schemeClr val="lt1"/>
+          </a:fontRef>
+        </p:style>
+        <p:txBody>
+          <a:bodyPr rtlCol="0" anchor="ctr"/>
+          <a:lstStyle/>
+          <a:p>
+            <a:pPr algn="ctr"/>
+            <a:r>
+              <a:rPr lang="de-DE" sz="1200" dirty="0" err="1"/>
+              <a:t>Wpf</a:t>
+            </a:r>
+            <a:r>
+              <a:rPr lang="de-DE" sz="1200" dirty="0"/>
+              <a:t>: </a:t>
+            </a:r>
+            <a:r>
+              <a:rPr lang="de-DE" sz="1200" dirty="0" err="1"/>
+              <a:t>WoopecCanvas</a:t>
+            </a:r>
+            <a:endParaRPr lang="de-DE" sz="1200" dirty="0"/>
+          </a:p>
+        </p:txBody>
+      </p:sp>
+      <p:cxnSp>
+        <p:nvCxnSpPr>
+          <p:cNvPr id="235" name="Gerade Verbindung mit Pfeil 234">
+            <a:extLst>
+              <a:ext uri="{FF2B5EF4-FFF2-40B4-BE49-F238E27FC236}">
+                <a16:creationId xmlns:a16="http://schemas.microsoft.com/office/drawing/2014/main" id="{4322F349-845D-505B-FF28-D7ED946C54BC}"/>
+              </a:ext>
+            </a:extLst>
+          </p:cNvPr>
+          <p:cNvCxnSpPr>
+            <a:cxnSpLocks/>
+            <a:stCxn id="232" idx="1"/>
+            <a:endCxn id="199" idx="3"/>
+          </p:cNvCxnSpPr>
+          <p:nvPr/>
+        </p:nvCxnSpPr>
+        <p:spPr>
+          <a:xfrm flipH="1" flipV="1">
+            <a:off x="1626057" y="393557"/>
+            <a:ext cx="9078410" cy="93535"/>
+          </a:xfrm>
+          <a:prstGeom prst="straightConnector1">
+            <a:avLst/>
+          </a:prstGeom>
+          <a:ln>
+            <a:solidFill>
+              <a:schemeClr val="tx1"/>
+            </a:solidFill>
+            <a:tailEnd type="triangle"/>
+          </a:ln>
+        </p:spPr>
+        <p:style>
+          <a:lnRef idx="2">
+            <a:schemeClr val="accent1"/>
+          </a:lnRef>
+          <a:fillRef idx="0">
+            <a:schemeClr val="accent1"/>
+          </a:fillRef>
+          <a:effectRef idx="1">
+            <a:schemeClr val="accent1"/>
+          </a:effectRef>
+          <a:fontRef idx="minor">
+            <a:schemeClr val="tx1"/>
+          </a:fontRef>
+        </p:style>
+      </p:cxnSp>
+    </p:spTree>
+    <p:extLst>
+      <p:ext uri="{BB962C8B-B14F-4D97-AF65-F5344CB8AC3E}">
+        <p14:creationId xmlns:p14="http://schemas.microsoft.com/office/powerpoint/2010/main" val="459255256"/>
+      </p:ext>
+    </p:extLst>
+  </p:cSld>
+  <p:clrMapOvr>
+    <a:masterClrMapping/>
+  </p:clrMapOvr>
+</p:sld>
+</file>
+
+<file path=ppt/slides/slide5.xml><?xml version="1.0" encoding="utf-8"?>
+<p:sld xmlns:a="http://schemas.openxmlformats.org/drawingml/2006/main" xmlns:r="http://schemas.openxmlformats.org/officeDocument/2006/relationships" xmlns:p="http://schemas.openxmlformats.org/presentationml/2006/main">
+  <p:cSld>
+    <p:spTree>
+      <p:nvGrpSpPr>
+        <p:cNvPr id="1" name="">
+          <a:extLst>
+            <a:ext uri="{FF2B5EF4-FFF2-40B4-BE49-F238E27FC236}">
+              <a16:creationId xmlns:a16="http://schemas.microsoft.com/office/drawing/2014/main" id="{0C9318BF-84F8-4687-1155-4979E57C2502}"/>
+            </a:ext>
+          </a:extLst>
+        </p:cNvPr>
+        <p:cNvGrpSpPr/>
+        <p:nvPr/>
+      </p:nvGrpSpPr>
+      <p:grpSpPr>
+        <a:xfrm>
+          <a:off x="0" y="0"/>
+          <a:ext cx="0" cy="0"/>
+          <a:chOff x="0" y="0"/>
+          <a:chExt cx="0" cy="0"/>
+        </a:xfrm>
+      </p:grpSpPr>
+      <p:cxnSp>
+        <p:nvCxnSpPr>
+          <p:cNvPr id="16" name="Gerade Verbindung mit Pfeil 15">
+            <a:extLst>
+              <a:ext uri="{FF2B5EF4-FFF2-40B4-BE49-F238E27FC236}">
+                <a16:creationId xmlns:a16="http://schemas.microsoft.com/office/drawing/2014/main" id="{2FA84DFF-1B90-8C49-8A60-3E4F0CD4031F}"/>
+              </a:ext>
+            </a:extLst>
+          </p:cNvPr>
+          <p:cNvCxnSpPr>
+            <a:cxnSpLocks/>
+          </p:cNvCxnSpPr>
+          <p:nvPr/>
+        </p:nvCxnSpPr>
+        <p:spPr>
+          <a:xfrm flipV="1">
+            <a:off x="11464908" y="5554272"/>
+            <a:ext cx="414292" cy="1"/>
+          </a:xfrm>
+          <a:prstGeom prst="straightConnector1">
+            <a:avLst/>
+          </a:prstGeom>
+          <a:ln>
+            <a:solidFill>
+              <a:schemeClr val="tx1"/>
+            </a:solidFill>
+            <a:tailEnd type="triangle"/>
+          </a:ln>
+        </p:spPr>
+        <p:style>
+          <a:lnRef idx="2">
+            <a:schemeClr val="accent1"/>
+          </a:lnRef>
+          <a:fillRef idx="0">
+            <a:schemeClr val="accent1"/>
+          </a:fillRef>
+          <a:effectRef idx="1">
+            <a:schemeClr val="accent1"/>
+          </a:effectRef>
+          <a:fontRef idx="minor">
+            <a:schemeClr val="tx1"/>
+          </a:fontRef>
+        </p:style>
+      </p:cxnSp>
+      <p:sp>
+        <p:nvSpPr>
+          <p:cNvPr id="12" name="Textfeld 11">
+            <a:extLst>
+              <a:ext uri="{FF2B5EF4-FFF2-40B4-BE49-F238E27FC236}">
+                <a16:creationId xmlns:a16="http://schemas.microsoft.com/office/drawing/2014/main" id="{EA069827-EB57-ACCB-AF21-2AC09708ED9D}"/>
+              </a:ext>
+            </a:extLst>
+          </p:cNvPr>
+          <p:cNvSpPr txBox="1"/>
+          <p:nvPr/>
+        </p:nvSpPr>
+        <p:spPr>
+          <a:xfrm>
+            <a:off x="10812653" y="5369606"/>
+            <a:ext cx="428322" cy="276999"/>
+          </a:xfrm>
+          <a:prstGeom prst="rect">
+            <a:avLst/>
+          </a:prstGeom>
+          <a:noFill/>
+        </p:spPr>
+        <p:txBody>
+          <a:bodyPr wrap="square" rtlCol="0">
+            <a:spAutoFit/>
+          </a:bodyPr>
+          <a:lstStyle/>
+          <a:p>
+            <a:r>
+              <a:rPr lang="de-DE" sz="1200" dirty="0" err="1"/>
+              <a:t>use</a:t>
+            </a:r>
+            <a:endParaRPr lang="de-DE" sz="1200" dirty="0"/>
+          </a:p>
+        </p:txBody>
+      </p:sp>
+      <p:sp>
+        <p:nvSpPr>
+          <p:cNvPr id="21" name="Rechteck 20">
+            <a:extLst>
+              <a:ext uri="{FF2B5EF4-FFF2-40B4-BE49-F238E27FC236}">
+                <a16:creationId xmlns:a16="http://schemas.microsoft.com/office/drawing/2014/main" id="{4763C7AF-CE7D-AD89-D3F1-61E4D4188EA8}"/>
+              </a:ext>
+            </a:extLst>
+          </p:cNvPr>
+          <p:cNvSpPr/>
+          <p:nvPr/>
+        </p:nvSpPr>
+        <p:spPr>
+          <a:xfrm>
+            <a:off x="2161170" y="1763338"/>
+            <a:ext cx="1597644" cy="742566"/>
+          </a:xfrm>
+          <a:prstGeom prst="rect">
+            <a:avLst/>
+          </a:prstGeom>
+        </p:spPr>
+        <p:style>
+          <a:lnRef idx="2">
+            <a:schemeClr val="accent1">
+              <a:shade val="15000"/>
+            </a:schemeClr>
+          </a:lnRef>
+          <a:fillRef idx="1">
+            <a:schemeClr val="accent1"/>
+          </a:fillRef>
+          <a:effectRef idx="0">
+            <a:schemeClr val="accent1"/>
+          </a:effectRef>
+          <a:fontRef idx="minor">
+            <a:schemeClr val="lt1"/>
+          </a:fontRef>
+        </p:style>
+        <p:txBody>
+          <a:bodyPr rtlCol="0" anchor="ctr"/>
+          <a:lstStyle/>
+          <a:p>
+            <a:pPr algn="ctr"/>
+            <a:r>
+              <a:rPr lang="de-DE" sz="1200" dirty="0" err="1"/>
+              <a:t>IScreenObject</a:t>
+            </a:r>
+            <a:endParaRPr lang="de-DE" sz="1200" dirty="0"/>
+          </a:p>
+          <a:p>
+            <a:pPr algn="ctr"/>
+            <a:r>
+              <a:rPr lang="de-DE" sz="1200" dirty="0"/>
+              <a:t>Channel</a:t>
+            </a:r>
+          </a:p>
+        </p:txBody>
+      </p:sp>
+      <p:sp>
+        <p:nvSpPr>
+          <p:cNvPr id="25" name="Rechteck 24">
+            <a:extLst>
+              <a:ext uri="{FF2B5EF4-FFF2-40B4-BE49-F238E27FC236}">
+                <a16:creationId xmlns:a16="http://schemas.microsoft.com/office/drawing/2014/main" id="{4F311EA1-D170-264F-40E5-87B8A557BB4C}"/>
+              </a:ext>
+            </a:extLst>
+          </p:cNvPr>
+          <p:cNvSpPr/>
+          <p:nvPr/>
+        </p:nvSpPr>
+        <p:spPr>
+          <a:xfrm>
+            <a:off x="4572985" y="933835"/>
+            <a:ext cx="2012908" cy="742566"/>
+          </a:xfrm>
+          <a:prstGeom prst="rect">
+            <a:avLst/>
+          </a:prstGeom>
+        </p:spPr>
+        <p:style>
+          <a:lnRef idx="2">
+            <a:schemeClr val="accent1">
+              <a:shade val="15000"/>
+            </a:schemeClr>
+          </a:lnRef>
+          <a:fillRef idx="1">
+            <a:schemeClr val="accent1"/>
+          </a:fillRef>
+          <a:effectRef idx="0">
+            <a:schemeClr val="accent1"/>
+          </a:effectRef>
+          <a:fontRef idx="minor">
+            <a:schemeClr val="lt1"/>
+          </a:fontRef>
+        </p:style>
+        <p:txBody>
+          <a:bodyPr rtlCol="0" anchor="ctr"/>
+          <a:lstStyle/>
+          <a:p>
+            <a:pPr algn="ctr"/>
+            <a:r>
+              <a:rPr lang="de-DE" sz="1200" dirty="0" err="1"/>
+              <a:t>S.O.Channel</a:t>
+            </a:r>
+            <a:endParaRPr lang="de-DE" sz="1200" dirty="0"/>
+          </a:p>
+          <a:p>
+            <a:pPr algn="ctr"/>
+            <a:r>
+              <a:rPr lang="de-DE" sz="1200" dirty="0" err="1"/>
+              <a:t>InClientProcess</a:t>
+            </a:r>
+            <a:endParaRPr lang="de-DE" sz="1200" dirty="0"/>
+          </a:p>
+        </p:txBody>
+      </p:sp>
+      <p:sp>
+        <p:nvSpPr>
+          <p:cNvPr id="26" name="Rechteck 25">
+            <a:extLst>
+              <a:ext uri="{FF2B5EF4-FFF2-40B4-BE49-F238E27FC236}">
+                <a16:creationId xmlns:a16="http://schemas.microsoft.com/office/drawing/2014/main" id="{853B1934-C901-54E8-A80A-C55C001E0C40}"/>
+              </a:ext>
+            </a:extLst>
+          </p:cNvPr>
+          <p:cNvSpPr/>
+          <p:nvPr/>
+        </p:nvSpPr>
+        <p:spPr>
+          <a:xfrm>
+            <a:off x="4572985" y="1763338"/>
+            <a:ext cx="2012908" cy="742566"/>
+          </a:xfrm>
+          <a:prstGeom prst="rect">
+            <a:avLst/>
+          </a:prstGeom>
+        </p:spPr>
+        <p:style>
+          <a:lnRef idx="2">
+            <a:schemeClr val="accent1">
+              <a:shade val="15000"/>
+            </a:schemeClr>
+          </a:lnRef>
+          <a:fillRef idx="1">
+            <a:schemeClr val="accent1"/>
+          </a:fillRef>
+          <a:effectRef idx="0">
+            <a:schemeClr val="accent1"/>
+          </a:effectRef>
+          <a:fontRef idx="minor">
+            <a:schemeClr val="lt1"/>
+          </a:fontRef>
+        </p:style>
+        <p:txBody>
+          <a:bodyPr rtlCol="0" anchor="ctr"/>
+          <a:lstStyle/>
+          <a:p>
+            <a:pPr algn="ctr"/>
+            <a:r>
+              <a:rPr lang="de-DE" sz="1200" dirty="0" err="1"/>
+              <a:t>S.O.Channel</a:t>
+            </a:r>
+            <a:endParaRPr lang="de-DE" sz="1200" dirty="0"/>
+          </a:p>
+          <a:p>
+            <a:pPr algn="ctr"/>
+            <a:r>
+              <a:rPr lang="de-DE" sz="1200" dirty="0" err="1"/>
+              <a:t>InServerProcess</a:t>
+            </a:r>
+            <a:endParaRPr lang="de-DE" sz="1200" dirty="0"/>
+          </a:p>
+        </p:txBody>
+      </p:sp>
+      <p:sp>
+        <p:nvSpPr>
+          <p:cNvPr id="27" name="Rechteck 26">
+            <a:extLst>
+              <a:ext uri="{FF2B5EF4-FFF2-40B4-BE49-F238E27FC236}">
+                <a16:creationId xmlns:a16="http://schemas.microsoft.com/office/drawing/2014/main" id="{A255FE76-B277-626E-19EC-3894777A7E7E}"/>
+              </a:ext>
+            </a:extLst>
+          </p:cNvPr>
+          <p:cNvSpPr/>
+          <p:nvPr/>
+        </p:nvSpPr>
+        <p:spPr>
+          <a:xfrm>
+            <a:off x="4572985" y="2586704"/>
+            <a:ext cx="2012908" cy="742566"/>
+          </a:xfrm>
+          <a:prstGeom prst="rect">
+            <a:avLst/>
+          </a:prstGeom>
+        </p:spPr>
+        <p:style>
+          <a:lnRef idx="2">
+            <a:schemeClr val="accent1">
+              <a:shade val="15000"/>
+            </a:schemeClr>
+          </a:lnRef>
+          <a:fillRef idx="1">
+            <a:schemeClr val="accent1"/>
+          </a:fillRef>
+          <a:effectRef idx="0">
+            <a:schemeClr val="accent1"/>
+          </a:effectRef>
+          <a:fontRef idx="minor">
+            <a:schemeClr val="lt1"/>
+          </a:fontRef>
+        </p:style>
+        <p:txBody>
+          <a:bodyPr rtlCol="0" anchor="ctr"/>
+          <a:lstStyle/>
+          <a:p>
+            <a:pPr algn="ctr"/>
+            <a:r>
+              <a:rPr lang="de-DE" sz="1200" dirty="0" err="1"/>
+              <a:t>S.O.Channel</a:t>
+            </a:r>
+            <a:endParaRPr lang="de-DE" sz="1200" dirty="0"/>
+          </a:p>
+          <a:p>
+            <a:pPr algn="ctr"/>
+            <a:r>
+              <a:rPr lang="de-DE" sz="1200" dirty="0" err="1"/>
+              <a:t>WithinProcess</a:t>
+            </a:r>
+            <a:endParaRPr lang="de-DE" sz="1200" dirty="0"/>
+          </a:p>
+        </p:txBody>
+      </p:sp>
+      <p:cxnSp>
+        <p:nvCxnSpPr>
+          <p:cNvPr id="28" name="Gerade Verbindung mit Pfeil 27">
+            <a:extLst>
+              <a:ext uri="{FF2B5EF4-FFF2-40B4-BE49-F238E27FC236}">
+                <a16:creationId xmlns:a16="http://schemas.microsoft.com/office/drawing/2014/main" id="{272BDC33-DC90-9A57-FC1A-5422F6311A82}"/>
+              </a:ext>
+            </a:extLst>
+          </p:cNvPr>
+          <p:cNvCxnSpPr>
+            <a:cxnSpLocks/>
+            <a:stCxn id="25" idx="1"/>
+            <a:endCxn id="21" idx="3"/>
+          </p:cNvCxnSpPr>
+          <p:nvPr/>
+        </p:nvCxnSpPr>
+        <p:spPr>
+          <a:xfrm flipH="1">
+            <a:off x="3758814" y="1305118"/>
+            <a:ext cx="814171" cy="829503"/>
+          </a:xfrm>
+          <a:prstGeom prst="straightConnector1">
+            <a:avLst/>
+          </a:prstGeom>
+          <a:ln>
+            <a:prstDash val="sysDash"/>
+            <a:tailEnd type="triangle"/>
+          </a:ln>
+        </p:spPr>
+        <p:style>
+          <a:lnRef idx="2">
+            <a:schemeClr val="accent1"/>
+          </a:lnRef>
+          <a:fillRef idx="0">
+            <a:schemeClr val="accent1"/>
+          </a:fillRef>
+          <a:effectRef idx="1">
+            <a:schemeClr val="accent1"/>
+          </a:effectRef>
+          <a:fontRef idx="minor">
+            <a:schemeClr val="tx1"/>
+          </a:fontRef>
+        </p:style>
+      </p:cxnSp>
+      <p:cxnSp>
+        <p:nvCxnSpPr>
+          <p:cNvPr id="31" name="Gerade Verbindung mit Pfeil 30">
+            <a:extLst>
+              <a:ext uri="{FF2B5EF4-FFF2-40B4-BE49-F238E27FC236}">
+                <a16:creationId xmlns:a16="http://schemas.microsoft.com/office/drawing/2014/main" id="{C48961A4-D909-50CA-0BD6-356CE5C06119}"/>
+              </a:ext>
+            </a:extLst>
+          </p:cNvPr>
+          <p:cNvCxnSpPr>
+            <a:cxnSpLocks/>
+            <a:stCxn id="26" idx="1"/>
+            <a:endCxn id="21" idx="3"/>
+          </p:cNvCxnSpPr>
+          <p:nvPr/>
+        </p:nvCxnSpPr>
+        <p:spPr>
+          <a:xfrm flipH="1">
+            <a:off x="3758814" y="2134621"/>
+            <a:ext cx="814171" cy="0"/>
+          </a:xfrm>
+          <a:prstGeom prst="straightConnector1">
+            <a:avLst/>
+          </a:prstGeom>
+          <a:ln>
+            <a:prstDash val="sysDash"/>
+            <a:tailEnd type="triangle"/>
+          </a:ln>
+        </p:spPr>
+        <p:style>
+          <a:lnRef idx="2">
+            <a:schemeClr val="accent1"/>
+          </a:lnRef>
+          <a:fillRef idx="0">
+            <a:schemeClr val="accent1"/>
+          </a:fillRef>
+          <a:effectRef idx="1">
+            <a:schemeClr val="accent1"/>
+          </a:effectRef>
+          <a:fontRef idx="minor">
+            <a:schemeClr val="tx1"/>
+          </a:fontRef>
+        </p:style>
+      </p:cxnSp>
+      <p:cxnSp>
+        <p:nvCxnSpPr>
+          <p:cNvPr id="34" name="Gerade Verbindung mit Pfeil 33">
+            <a:extLst>
+              <a:ext uri="{FF2B5EF4-FFF2-40B4-BE49-F238E27FC236}">
+                <a16:creationId xmlns:a16="http://schemas.microsoft.com/office/drawing/2014/main" id="{9A3BA357-E8E5-603A-85ED-6DDC9C2BCF12}"/>
+              </a:ext>
+            </a:extLst>
+          </p:cNvPr>
+          <p:cNvCxnSpPr>
+            <a:cxnSpLocks/>
+            <a:stCxn id="27" idx="1"/>
+            <a:endCxn id="21" idx="3"/>
+          </p:cNvCxnSpPr>
+          <p:nvPr/>
+        </p:nvCxnSpPr>
+        <p:spPr>
+          <a:xfrm flipH="1" flipV="1">
+            <a:off x="3758814" y="2134621"/>
+            <a:ext cx="814171" cy="823366"/>
+          </a:xfrm>
+          <a:prstGeom prst="straightConnector1">
+            <a:avLst/>
+          </a:prstGeom>
+          <a:ln>
+            <a:prstDash val="sysDash"/>
+            <a:tailEnd type="triangle"/>
+          </a:ln>
+        </p:spPr>
+        <p:style>
+          <a:lnRef idx="2">
+            <a:schemeClr val="accent1"/>
+          </a:lnRef>
+          <a:fillRef idx="0">
+            <a:schemeClr val="accent1"/>
+          </a:fillRef>
+          <a:effectRef idx="1">
+            <a:schemeClr val="accent1"/>
+          </a:effectRef>
+          <a:fontRef idx="minor">
+            <a:schemeClr val="tx1"/>
+          </a:fontRef>
+        </p:style>
+      </p:cxnSp>
+      <p:sp>
+        <p:nvSpPr>
+          <p:cNvPr id="38" name="Textfeld 37">
+            <a:extLst>
+              <a:ext uri="{FF2B5EF4-FFF2-40B4-BE49-F238E27FC236}">
+                <a16:creationId xmlns:a16="http://schemas.microsoft.com/office/drawing/2014/main" id="{4DB6A188-0B5B-E3DF-F257-2D92ACA40F78}"/>
+              </a:ext>
+            </a:extLst>
+          </p:cNvPr>
+          <p:cNvSpPr txBox="1"/>
+          <p:nvPr/>
+        </p:nvSpPr>
+        <p:spPr>
+          <a:xfrm>
+            <a:off x="153412" y="6364903"/>
+            <a:ext cx="875240" cy="369332"/>
+          </a:xfrm>
+          <a:prstGeom prst="rect">
+            <a:avLst/>
+          </a:prstGeom>
+          <a:noFill/>
+        </p:spPr>
+        <p:txBody>
+          <a:bodyPr wrap="none" rtlCol="0">
+            <a:spAutoFit/>
+          </a:bodyPr>
+          <a:lstStyle/>
+          <a:p>
+            <a:r>
+              <a:rPr lang="de-DE" dirty="0"/>
+              <a:t>Level 3</a:t>
+            </a:r>
+          </a:p>
+        </p:txBody>
+      </p:sp>
+      <p:cxnSp>
+        <p:nvCxnSpPr>
+          <p:cNvPr id="39" name="Gerade Verbindung mit Pfeil 38">
+            <a:extLst>
+              <a:ext uri="{FF2B5EF4-FFF2-40B4-BE49-F238E27FC236}">
+                <a16:creationId xmlns:a16="http://schemas.microsoft.com/office/drawing/2014/main" id="{C351B3E6-236B-11B3-6A75-8F58360F40D6}"/>
+              </a:ext>
+            </a:extLst>
+          </p:cNvPr>
+          <p:cNvCxnSpPr>
+            <a:cxnSpLocks/>
+          </p:cNvCxnSpPr>
+          <p:nvPr/>
+        </p:nvCxnSpPr>
+        <p:spPr>
+          <a:xfrm>
+            <a:off x="11464908" y="5943180"/>
+            <a:ext cx="414292" cy="0"/>
+          </a:xfrm>
+          <a:prstGeom prst="straightConnector1">
+            <a:avLst/>
+          </a:prstGeom>
+          <a:ln>
+            <a:prstDash val="sysDash"/>
+            <a:tailEnd type="triangle"/>
+          </a:ln>
+        </p:spPr>
+        <p:style>
+          <a:lnRef idx="2">
+            <a:schemeClr val="accent1"/>
+          </a:lnRef>
+          <a:fillRef idx="0">
+            <a:schemeClr val="accent1"/>
+          </a:fillRef>
+          <a:effectRef idx="1">
+            <a:schemeClr val="accent1"/>
+          </a:effectRef>
+          <a:fontRef idx="minor">
+            <a:schemeClr val="tx1"/>
+          </a:fontRef>
+        </p:style>
+      </p:cxnSp>
+      <p:sp>
+        <p:nvSpPr>
+          <p:cNvPr id="41" name="Textfeld 40">
+            <a:extLst>
+              <a:ext uri="{FF2B5EF4-FFF2-40B4-BE49-F238E27FC236}">
+                <a16:creationId xmlns:a16="http://schemas.microsoft.com/office/drawing/2014/main" id="{F75B4F1E-E240-DE38-DB2F-BC433E0E9017}"/>
+              </a:ext>
+            </a:extLst>
+          </p:cNvPr>
+          <p:cNvSpPr txBox="1"/>
+          <p:nvPr/>
+        </p:nvSpPr>
+        <p:spPr>
+          <a:xfrm>
+            <a:off x="10812653" y="5772805"/>
+            <a:ext cx="296876" cy="276999"/>
+          </a:xfrm>
+          <a:prstGeom prst="rect">
+            <a:avLst/>
+          </a:prstGeom>
+          <a:noFill/>
+        </p:spPr>
+        <p:txBody>
+          <a:bodyPr wrap="square" rtlCol="0">
+            <a:spAutoFit/>
+          </a:bodyPr>
+          <a:lstStyle/>
+          <a:p>
+            <a:r>
+              <a:rPr lang="de-DE" sz="1200" dirty="0" err="1"/>
+              <a:t>is</a:t>
+            </a:r>
+            <a:endParaRPr lang="de-DE" sz="1200" dirty="0"/>
+          </a:p>
+        </p:txBody>
+      </p:sp>
+      <p:sp>
+        <p:nvSpPr>
+          <p:cNvPr id="44" name="Rechteck 43">
+            <a:extLst>
+              <a:ext uri="{FF2B5EF4-FFF2-40B4-BE49-F238E27FC236}">
+                <a16:creationId xmlns:a16="http://schemas.microsoft.com/office/drawing/2014/main" id="{9A538A26-68E8-F15C-C12E-ED56FC47692A}"/>
+              </a:ext>
+            </a:extLst>
+          </p:cNvPr>
+          <p:cNvSpPr/>
+          <p:nvPr/>
+        </p:nvSpPr>
+        <p:spPr>
+          <a:xfrm>
+            <a:off x="5226510" y="0"/>
+            <a:ext cx="3105293" cy="742566"/>
+          </a:xfrm>
+          <a:prstGeom prst="rect">
+            <a:avLst/>
+          </a:prstGeom>
+        </p:spPr>
+        <p:style>
+          <a:lnRef idx="2">
+            <a:schemeClr val="accent1">
+              <a:shade val="15000"/>
+            </a:schemeClr>
+          </a:lnRef>
+          <a:fillRef idx="1">
+            <a:schemeClr val="accent1"/>
+          </a:fillRef>
+          <a:effectRef idx="0">
+            <a:schemeClr val="accent1"/>
+          </a:effectRef>
+          <a:fontRef idx="minor">
+            <a:schemeClr val="lt1"/>
+          </a:fontRef>
+        </p:style>
+        <p:txBody>
+          <a:bodyPr rtlCol="0" anchor="ctr"/>
+          <a:lstStyle/>
+          <a:p>
+            <a:pPr algn="ctr"/>
+            <a:r>
+              <a:rPr lang="de-DE" sz="1200" dirty="0"/>
+              <a:t>Communication</a:t>
+            </a:r>
+            <a:br>
+              <a:rPr lang="de-DE" sz="1200" dirty="0"/>
+            </a:br>
+            <a:r>
+              <a:rPr lang="de-DE" sz="1200" dirty="0"/>
+              <a:t>Broker</a:t>
+            </a:r>
+          </a:p>
+        </p:txBody>
+      </p:sp>
+      <p:sp>
+        <p:nvSpPr>
+          <p:cNvPr id="47" name="Rechteck 46">
+            <a:extLst>
+              <a:ext uri="{FF2B5EF4-FFF2-40B4-BE49-F238E27FC236}">
+                <a16:creationId xmlns:a16="http://schemas.microsoft.com/office/drawing/2014/main" id="{4DF89836-2498-49A7-DE08-05A0E342F4B0}"/>
+              </a:ext>
+            </a:extLst>
+          </p:cNvPr>
+          <p:cNvSpPr/>
+          <p:nvPr/>
+        </p:nvSpPr>
+        <p:spPr>
+          <a:xfrm>
+            <a:off x="2300471" y="842897"/>
+            <a:ext cx="8512182" cy="5522006"/>
+          </a:xfrm>
+          <a:prstGeom prst="rect">
+            <a:avLst/>
+          </a:prstGeom>
+          <a:noFill/>
+          <a:ln>
+            <a:prstDash val="dash"/>
+          </a:ln>
+        </p:spPr>
+        <p:style>
+          <a:lnRef idx="2">
+            <a:schemeClr val="accent1">
+              <a:shade val="15000"/>
+            </a:schemeClr>
+          </a:lnRef>
+          <a:fillRef idx="1">
+            <a:schemeClr val="accent1"/>
+          </a:fillRef>
+          <a:effectRef idx="0">
+            <a:schemeClr val="accent1"/>
+          </a:effectRef>
+          <a:fontRef idx="minor">
+            <a:schemeClr val="lt1"/>
+          </a:fontRef>
+        </p:style>
+        <p:txBody>
+          <a:bodyPr rtlCol="0" anchor="ctr"/>
+          <a:lstStyle/>
+          <a:p>
+            <a:pPr algn="ctr"/>
+            <a:endParaRPr lang="de-DE" sz="1200"/>
+          </a:p>
+        </p:txBody>
+      </p:sp>
+      <p:sp>
+        <p:nvSpPr>
+          <p:cNvPr id="50" name="Rechteck 49">
+            <a:extLst>
+              <a:ext uri="{FF2B5EF4-FFF2-40B4-BE49-F238E27FC236}">
+                <a16:creationId xmlns:a16="http://schemas.microsoft.com/office/drawing/2014/main" id="{816C6BEB-1954-E7DF-B703-AE7718F0FD75}"/>
+              </a:ext>
+            </a:extLst>
+          </p:cNvPr>
+          <p:cNvSpPr/>
+          <p:nvPr/>
+        </p:nvSpPr>
+        <p:spPr>
+          <a:xfrm>
+            <a:off x="2192053" y="4466334"/>
+            <a:ext cx="1597644" cy="742566"/>
+          </a:xfrm>
+          <a:prstGeom prst="rect">
+            <a:avLst/>
+          </a:prstGeom>
+        </p:spPr>
+        <p:style>
+          <a:lnRef idx="2">
+            <a:schemeClr val="accent1">
+              <a:shade val="15000"/>
+            </a:schemeClr>
+          </a:lnRef>
+          <a:fillRef idx="1">
+            <a:schemeClr val="accent1"/>
+          </a:fillRef>
+          <a:effectRef idx="0">
+            <a:schemeClr val="accent1"/>
+          </a:effectRef>
+          <a:fontRef idx="minor">
+            <a:schemeClr val="lt1"/>
+          </a:fontRef>
+        </p:style>
+        <p:txBody>
+          <a:bodyPr rtlCol="0" anchor="ctr"/>
+          <a:lstStyle/>
+          <a:p>
+            <a:pPr algn="ctr"/>
+            <a:r>
+              <a:rPr lang="de-DE" sz="1200" dirty="0" err="1"/>
+              <a:t>IScreenResult</a:t>
+            </a:r>
+            <a:endParaRPr lang="de-DE" sz="1200" dirty="0"/>
+          </a:p>
+          <a:p>
+            <a:pPr algn="ctr"/>
+            <a:r>
+              <a:rPr lang="de-DE" sz="1200" dirty="0"/>
+              <a:t>Channel</a:t>
+            </a:r>
+          </a:p>
+        </p:txBody>
+      </p:sp>
+      <p:sp>
+        <p:nvSpPr>
+          <p:cNvPr id="51" name="Rechteck 50">
+            <a:extLst>
+              <a:ext uri="{FF2B5EF4-FFF2-40B4-BE49-F238E27FC236}">
+                <a16:creationId xmlns:a16="http://schemas.microsoft.com/office/drawing/2014/main" id="{DC4650E1-3AA9-D3EF-69CC-61ED83745519}"/>
+              </a:ext>
+            </a:extLst>
+          </p:cNvPr>
+          <p:cNvSpPr/>
+          <p:nvPr/>
+        </p:nvSpPr>
+        <p:spPr>
+          <a:xfrm>
+            <a:off x="4572985" y="3649369"/>
+            <a:ext cx="2012908" cy="742566"/>
+          </a:xfrm>
+          <a:prstGeom prst="rect">
+            <a:avLst/>
+          </a:prstGeom>
+        </p:spPr>
+        <p:style>
+          <a:lnRef idx="2">
+            <a:schemeClr val="accent1">
+              <a:shade val="15000"/>
+            </a:schemeClr>
+          </a:lnRef>
+          <a:fillRef idx="1">
+            <a:schemeClr val="accent1"/>
+          </a:fillRef>
+          <a:effectRef idx="0">
+            <a:schemeClr val="accent1"/>
+          </a:effectRef>
+          <a:fontRef idx="minor">
+            <a:schemeClr val="lt1"/>
+          </a:fontRef>
+        </p:style>
+        <p:txBody>
+          <a:bodyPr rtlCol="0" anchor="ctr"/>
+          <a:lstStyle/>
+          <a:p>
+            <a:pPr algn="ctr"/>
+            <a:r>
+              <a:rPr lang="de-DE" sz="1200" dirty="0" err="1"/>
+              <a:t>S.R.Channel</a:t>
+            </a:r>
+            <a:endParaRPr lang="de-DE" sz="1200" dirty="0"/>
+          </a:p>
+          <a:p>
+            <a:pPr algn="ctr"/>
+            <a:r>
+              <a:rPr lang="de-DE" sz="1200" dirty="0" err="1"/>
+              <a:t>InClientProcess</a:t>
+            </a:r>
+            <a:endParaRPr lang="de-DE" sz="1200" dirty="0"/>
+          </a:p>
+        </p:txBody>
+      </p:sp>
+      <p:sp>
+        <p:nvSpPr>
+          <p:cNvPr id="52" name="Rechteck 51">
+            <a:extLst>
+              <a:ext uri="{FF2B5EF4-FFF2-40B4-BE49-F238E27FC236}">
+                <a16:creationId xmlns:a16="http://schemas.microsoft.com/office/drawing/2014/main" id="{3015B66E-6B3C-D561-350D-AD820B2E148B}"/>
+              </a:ext>
+            </a:extLst>
+          </p:cNvPr>
+          <p:cNvSpPr/>
+          <p:nvPr/>
+        </p:nvSpPr>
+        <p:spPr>
+          <a:xfrm>
+            <a:off x="4572985" y="4478872"/>
+            <a:ext cx="2012908" cy="742566"/>
+          </a:xfrm>
+          <a:prstGeom prst="rect">
+            <a:avLst/>
+          </a:prstGeom>
+        </p:spPr>
+        <p:style>
+          <a:lnRef idx="2">
+            <a:schemeClr val="accent1">
+              <a:shade val="15000"/>
+            </a:schemeClr>
+          </a:lnRef>
+          <a:fillRef idx="1">
+            <a:schemeClr val="accent1"/>
+          </a:fillRef>
+          <a:effectRef idx="0">
+            <a:schemeClr val="accent1"/>
+          </a:effectRef>
+          <a:fontRef idx="minor">
+            <a:schemeClr val="lt1"/>
+          </a:fontRef>
+        </p:style>
+        <p:txBody>
+          <a:bodyPr rtlCol="0" anchor="ctr"/>
+          <a:lstStyle/>
+          <a:p>
+            <a:pPr algn="ctr"/>
+            <a:r>
+              <a:rPr lang="de-DE" sz="1200" dirty="0" err="1"/>
+              <a:t>S.R.Channel</a:t>
+            </a:r>
+            <a:endParaRPr lang="de-DE" sz="1200" dirty="0"/>
+          </a:p>
+          <a:p>
+            <a:pPr algn="ctr"/>
+            <a:r>
+              <a:rPr lang="de-DE" sz="1200" dirty="0" err="1"/>
+              <a:t>InServerProcess</a:t>
+            </a:r>
+            <a:endParaRPr lang="de-DE" sz="1200" dirty="0"/>
+          </a:p>
+        </p:txBody>
+      </p:sp>
+      <p:sp>
+        <p:nvSpPr>
+          <p:cNvPr id="53" name="Rechteck 52">
+            <a:extLst>
+              <a:ext uri="{FF2B5EF4-FFF2-40B4-BE49-F238E27FC236}">
+                <a16:creationId xmlns:a16="http://schemas.microsoft.com/office/drawing/2014/main" id="{9C76A5F0-E779-D6B2-384B-534460C94D53}"/>
+              </a:ext>
+            </a:extLst>
+          </p:cNvPr>
+          <p:cNvSpPr/>
+          <p:nvPr/>
+        </p:nvSpPr>
+        <p:spPr>
+          <a:xfrm>
+            <a:off x="4572985" y="5302238"/>
+            <a:ext cx="2012908" cy="742566"/>
+          </a:xfrm>
+          <a:prstGeom prst="rect">
+            <a:avLst/>
+          </a:prstGeom>
+        </p:spPr>
+        <p:style>
+          <a:lnRef idx="2">
+            <a:schemeClr val="accent1">
+              <a:shade val="15000"/>
+            </a:schemeClr>
+          </a:lnRef>
+          <a:fillRef idx="1">
+            <a:schemeClr val="accent1"/>
+          </a:fillRef>
+          <a:effectRef idx="0">
+            <a:schemeClr val="accent1"/>
+          </a:effectRef>
+          <a:fontRef idx="minor">
+            <a:schemeClr val="lt1"/>
+          </a:fontRef>
+        </p:style>
+        <p:txBody>
+          <a:bodyPr rtlCol="0" anchor="ctr"/>
+          <a:lstStyle/>
+          <a:p>
+            <a:pPr algn="ctr"/>
+            <a:r>
+              <a:rPr lang="de-DE" sz="1200" dirty="0" err="1"/>
+              <a:t>S.R.Channel</a:t>
+            </a:r>
+            <a:endParaRPr lang="de-DE" sz="1200" dirty="0"/>
+          </a:p>
+          <a:p>
+            <a:pPr algn="ctr"/>
+            <a:r>
+              <a:rPr lang="de-DE" sz="1200" dirty="0" err="1"/>
+              <a:t>WithinProcess</a:t>
+            </a:r>
+            <a:endParaRPr lang="de-DE" sz="1200" dirty="0"/>
+          </a:p>
+        </p:txBody>
+      </p:sp>
+      <p:cxnSp>
+        <p:nvCxnSpPr>
+          <p:cNvPr id="54" name="Gerade Verbindung mit Pfeil 53">
+            <a:extLst>
+              <a:ext uri="{FF2B5EF4-FFF2-40B4-BE49-F238E27FC236}">
+                <a16:creationId xmlns:a16="http://schemas.microsoft.com/office/drawing/2014/main" id="{C27B2627-4BBF-C335-E827-1D27D70280CE}"/>
+              </a:ext>
+            </a:extLst>
+          </p:cNvPr>
+          <p:cNvCxnSpPr>
+            <a:cxnSpLocks/>
+            <a:stCxn id="51" idx="1"/>
+            <a:endCxn id="50" idx="3"/>
+          </p:cNvCxnSpPr>
+          <p:nvPr/>
+        </p:nvCxnSpPr>
+        <p:spPr>
+          <a:xfrm flipH="1">
+            <a:off x="3789697" y="4020652"/>
+            <a:ext cx="783288" cy="816965"/>
+          </a:xfrm>
+          <a:prstGeom prst="straightConnector1">
+            <a:avLst/>
+          </a:prstGeom>
+          <a:ln>
+            <a:prstDash val="sysDash"/>
+            <a:tailEnd type="triangle"/>
+          </a:ln>
+        </p:spPr>
+        <p:style>
+          <a:lnRef idx="2">
+            <a:schemeClr val="accent1"/>
+          </a:lnRef>
+          <a:fillRef idx="0">
+            <a:schemeClr val="accent1"/>
+          </a:fillRef>
+          <a:effectRef idx="1">
+            <a:schemeClr val="accent1"/>
+          </a:effectRef>
+          <a:fontRef idx="minor">
+            <a:schemeClr val="tx1"/>
+          </a:fontRef>
+        </p:style>
+      </p:cxnSp>
+      <p:cxnSp>
+        <p:nvCxnSpPr>
+          <p:cNvPr id="56" name="Gerade Verbindung mit Pfeil 55">
+            <a:extLst>
+              <a:ext uri="{FF2B5EF4-FFF2-40B4-BE49-F238E27FC236}">
+                <a16:creationId xmlns:a16="http://schemas.microsoft.com/office/drawing/2014/main" id="{26C1125B-6862-5110-56EA-132CAEA77D21}"/>
+              </a:ext>
+            </a:extLst>
+          </p:cNvPr>
+          <p:cNvCxnSpPr>
+            <a:cxnSpLocks/>
+            <a:stCxn id="52" idx="1"/>
+            <a:endCxn id="50" idx="3"/>
+          </p:cNvCxnSpPr>
+          <p:nvPr/>
+        </p:nvCxnSpPr>
+        <p:spPr>
+          <a:xfrm flipH="1" flipV="1">
+            <a:off x="3789697" y="4837617"/>
+            <a:ext cx="783288" cy="12538"/>
+          </a:xfrm>
+          <a:prstGeom prst="straightConnector1">
+            <a:avLst/>
+          </a:prstGeom>
+          <a:ln>
+            <a:prstDash val="sysDash"/>
+            <a:tailEnd type="triangle"/>
+          </a:ln>
+        </p:spPr>
+        <p:style>
+          <a:lnRef idx="2">
+            <a:schemeClr val="accent1"/>
+          </a:lnRef>
+          <a:fillRef idx="0">
+            <a:schemeClr val="accent1"/>
+          </a:fillRef>
+          <a:effectRef idx="1">
+            <a:schemeClr val="accent1"/>
+          </a:effectRef>
+          <a:fontRef idx="minor">
+            <a:schemeClr val="tx1"/>
+          </a:fontRef>
+        </p:style>
+      </p:cxnSp>
+      <p:cxnSp>
+        <p:nvCxnSpPr>
+          <p:cNvPr id="57" name="Gerade Verbindung mit Pfeil 56">
+            <a:extLst>
+              <a:ext uri="{FF2B5EF4-FFF2-40B4-BE49-F238E27FC236}">
+                <a16:creationId xmlns:a16="http://schemas.microsoft.com/office/drawing/2014/main" id="{4E580FB3-BF70-A467-F891-B2922753B251}"/>
+              </a:ext>
+            </a:extLst>
+          </p:cNvPr>
+          <p:cNvCxnSpPr>
+            <a:cxnSpLocks/>
+            <a:stCxn id="53" idx="1"/>
+            <a:endCxn id="50" idx="3"/>
+          </p:cNvCxnSpPr>
+          <p:nvPr/>
+        </p:nvCxnSpPr>
+        <p:spPr>
+          <a:xfrm flipH="1" flipV="1">
+            <a:off x="3789697" y="4837617"/>
+            <a:ext cx="783288" cy="835904"/>
+          </a:xfrm>
+          <a:prstGeom prst="straightConnector1">
+            <a:avLst/>
+          </a:prstGeom>
+          <a:ln>
+            <a:prstDash val="sysDash"/>
+            <a:tailEnd type="triangle"/>
+          </a:ln>
+        </p:spPr>
+        <p:style>
+          <a:lnRef idx="2">
+            <a:schemeClr val="accent1"/>
+          </a:lnRef>
+          <a:fillRef idx="0">
+            <a:schemeClr val="accent1"/>
+          </a:fillRef>
+          <a:effectRef idx="1">
+            <a:schemeClr val="accent1"/>
+          </a:effectRef>
+          <a:fontRef idx="minor">
+            <a:schemeClr val="tx1"/>
+          </a:fontRef>
+        </p:style>
+      </p:cxnSp>
+      <p:sp>
+        <p:nvSpPr>
+          <p:cNvPr id="5" name="Rechteck 4">
+            <a:extLst>
+              <a:ext uri="{FF2B5EF4-FFF2-40B4-BE49-F238E27FC236}">
+                <a16:creationId xmlns:a16="http://schemas.microsoft.com/office/drawing/2014/main" id="{0292FC26-5E6A-8E93-1515-CED3331334B3}"/>
+              </a:ext>
+            </a:extLst>
+          </p:cNvPr>
+          <p:cNvSpPr/>
+          <p:nvPr/>
+        </p:nvSpPr>
+        <p:spPr>
+          <a:xfrm>
+            <a:off x="9566387" y="3118175"/>
+            <a:ext cx="1597644" cy="742566"/>
+          </a:xfrm>
+          <a:prstGeom prst="rect">
+            <a:avLst/>
+          </a:prstGeom>
+        </p:spPr>
+        <p:style>
+          <a:lnRef idx="2">
+            <a:schemeClr val="accent1">
+              <a:shade val="15000"/>
+            </a:schemeClr>
+          </a:lnRef>
+          <a:fillRef idx="1">
+            <a:schemeClr val="accent1"/>
+          </a:fillRef>
+          <a:effectRef idx="0">
+            <a:schemeClr val="accent1"/>
+          </a:effectRef>
+          <a:fontRef idx="minor">
+            <a:schemeClr val="lt1"/>
+          </a:fontRef>
+        </p:style>
+        <p:txBody>
+          <a:bodyPr rtlCol="0" anchor="ctr"/>
+          <a:lstStyle/>
+          <a:p>
+            <a:pPr algn="ctr"/>
+            <a:r>
+              <a:rPr lang="de-DE" sz="1200" dirty="0" err="1"/>
+              <a:t>IScreenObject</a:t>
+            </a:r>
+            <a:endParaRPr lang="de-DE" sz="1200" dirty="0"/>
+          </a:p>
+          <a:p>
+            <a:pPr algn="ctr"/>
+            <a:r>
+              <a:rPr lang="de-DE" sz="1200" dirty="0"/>
+              <a:t>Consumer</a:t>
+            </a:r>
+          </a:p>
+        </p:txBody>
+      </p:sp>
+      <p:sp>
+        <p:nvSpPr>
+          <p:cNvPr id="8" name="Rechteck 7">
+            <a:extLst>
+              <a:ext uri="{FF2B5EF4-FFF2-40B4-BE49-F238E27FC236}">
+                <a16:creationId xmlns:a16="http://schemas.microsoft.com/office/drawing/2014/main" id="{8BD8E768-275D-342A-E841-A57AEFA19174}"/>
+              </a:ext>
+            </a:extLst>
+          </p:cNvPr>
+          <p:cNvSpPr/>
+          <p:nvPr/>
+        </p:nvSpPr>
+        <p:spPr>
+          <a:xfrm>
+            <a:off x="7185063" y="3118175"/>
+            <a:ext cx="2012908" cy="742566"/>
+          </a:xfrm>
+          <a:prstGeom prst="rect">
+            <a:avLst/>
+          </a:prstGeom>
+        </p:spPr>
+        <p:style>
+          <a:lnRef idx="2">
+            <a:schemeClr val="accent1">
+              <a:shade val="15000"/>
+            </a:schemeClr>
+          </a:lnRef>
+          <a:fillRef idx="1">
+            <a:schemeClr val="accent1"/>
+          </a:fillRef>
+          <a:effectRef idx="0">
+            <a:schemeClr val="accent1"/>
+          </a:effectRef>
+          <a:fontRef idx="minor">
+            <a:schemeClr val="lt1"/>
+          </a:fontRef>
+        </p:style>
+        <p:txBody>
+          <a:bodyPr rtlCol="0" anchor="ctr"/>
+          <a:lstStyle/>
+          <a:p>
+            <a:pPr algn="ctr"/>
+            <a:r>
+              <a:rPr lang="de-DE" sz="1200" dirty="0"/>
+              <a:t>S.O.</a:t>
+            </a:r>
+            <a:br>
+              <a:rPr lang="de-DE" sz="1200" dirty="0"/>
+            </a:br>
+            <a:r>
+              <a:rPr lang="de-DE" sz="1200" dirty="0"/>
+              <a:t> Consumer</a:t>
+            </a:r>
+          </a:p>
+        </p:txBody>
+      </p:sp>
+      <p:cxnSp>
+        <p:nvCxnSpPr>
+          <p:cNvPr id="15" name="Gerade Verbindung mit Pfeil 14">
+            <a:extLst>
+              <a:ext uri="{FF2B5EF4-FFF2-40B4-BE49-F238E27FC236}">
+                <a16:creationId xmlns:a16="http://schemas.microsoft.com/office/drawing/2014/main" id="{BAFB7820-1B13-DC00-A7CE-C37558E8C50B}"/>
+              </a:ext>
+            </a:extLst>
+          </p:cNvPr>
+          <p:cNvCxnSpPr>
+            <a:cxnSpLocks/>
+            <a:stCxn id="8" idx="3"/>
+            <a:endCxn id="5" idx="1"/>
+          </p:cNvCxnSpPr>
+          <p:nvPr/>
+        </p:nvCxnSpPr>
+        <p:spPr>
+          <a:xfrm>
+            <a:off x="9197971" y="3489458"/>
+            <a:ext cx="368416" cy="0"/>
+          </a:xfrm>
+          <a:prstGeom prst="straightConnector1">
+            <a:avLst/>
+          </a:prstGeom>
+          <a:ln>
+            <a:prstDash val="sysDash"/>
+            <a:tailEnd type="triangle"/>
+          </a:ln>
+        </p:spPr>
+        <p:style>
+          <a:lnRef idx="2">
+            <a:schemeClr val="accent1"/>
+          </a:lnRef>
+          <a:fillRef idx="0">
+            <a:schemeClr val="accent1"/>
+          </a:fillRef>
+          <a:effectRef idx="1">
+            <a:schemeClr val="accent1"/>
+          </a:effectRef>
+          <a:fontRef idx="minor">
+            <a:schemeClr val="tx1"/>
+          </a:fontRef>
+        </p:style>
+      </p:cxnSp>
+      <p:sp>
+        <p:nvSpPr>
+          <p:cNvPr id="24" name="Textfeld 23">
+            <a:extLst>
+              <a:ext uri="{FF2B5EF4-FFF2-40B4-BE49-F238E27FC236}">
+                <a16:creationId xmlns:a16="http://schemas.microsoft.com/office/drawing/2014/main" id="{465CE32F-6D71-6785-11D9-2A104619EE57}"/>
+              </a:ext>
+            </a:extLst>
+          </p:cNvPr>
+          <p:cNvSpPr txBox="1"/>
+          <p:nvPr/>
+        </p:nvSpPr>
+        <p:spPr>
+          <a:xfrm>
+            <a:off x="178296" y="2564906"/>
+            <a:ext cx="3557192" cy="2031325"/>
+          </a:xfrm>
+          <a:prstGeom prst="rect">
+            <a:avLst/>
+          </a:prstGeom>
+          <a:noFill/>
+        </p:spPr>
+        <p:txBody>
+          <a:bodyPr wrap="none" rtlCol="0">
+            <a:spAutoFit/>
+          </a:bodyPr>
+          <a:lstStyle/>
+          <a:p>
+            <a:r>
+              <a:rPr lang="de-DE" dirty="0"/>
+              <a:t>Fehlen noch</a:t>
+            </a:r>
+          </a:p>
+          <a:p>
+            <a:pPr marL="285750" indent="-285750">
+              <a:buFontTx/>
+              <a:buChar char="-"/>
+            </a:pPr>
+            <a:r>
+              <a:rPr lang="de-DE" dirty="0" err="1"/>
+              <a:t>LowLevelScreenForUnitTest</a:t>
+            </a:r>
+            <a:endParaRPr lang="de-DE" dirty="0"/>
+          </a:p>
+          <a:p>
+            <a:pPr marL="285750" indent="-285750">
+              <a:buFontTx/>
+              <a:buChar char="-"/>
+            </a:pPr>
+            <a:r>
+              <a:rPr lang="de-DE" dirty="0" err="1"/>
+              <a:t>DefaultProducerAndConsumer</a:t>
+            </a:r>
+            <a:endParaRPr lang="de-DE" dirty="0"/>
+          </a:p>
+          <a:p>
+            <a:pPr marL="285750" indent="-285750">
+              <a:buFontTx/>
+              <a:buChar char="-"/>
+            </a:pPr>
+            <a:endParaRPr lang="de-DE" dirty="0"/>
+          </a:p>
+          <a:p>
+            <a:pPr marL="285750" indent="-285750">
+              <a:buFontTx/>
+              <a:buChar char="-"/>
+            </a:pPr>
+            <a:r>
+              <a:rPr lang="de-DE" dirty="0" err="1"/>
+              <a:t>ProcessChannelConverter</a:t>
+            </a:r>
+            <a:br>
+              <a:rPr lang="de-DE" dirty="0"/>
+            </a:br>
+            <a:r>
+              <a:rPr lang="de-DE" dirty="0"/>
+              <a:t>(</a:t>
+            </a:r>
+            <a:r>
+              <a:rPr lang="de-DE" dirty="0" err="1"/>
+              <a:t>json</a:t>
+            </a:r>
+            <a:r>
+              <a:rPr lang="de-DE" dirty="0"/>
+              <a:t>-Serialisierung)</a:t>
+            </a:r>
+          </a:p>
+          <a:p>
+            <a:pPr marL="285750" indent="-285750">
+              <a:buFontTx/>
+              <a:buChar char="-"/>
+            </a:pPr>
+            <a:r>
+              <a:rPr lang="de-DE" dirty="0" err="1"/>
+              <a:t>WoopecCodeFinder</a:t>
+            </a:r>
+            <a:endParaRPr lang="de-DE" dirty="0"/>
+          </a:p>
+        </p:txBody>
+      </p:sp>
+    </p:spTree>
+    <p:extLst>
+      <p:ext uri="{BB962C8B-B14F-4D97-AF65-F5344CB8AC3E}">
+        <p14:creationId xmlns:p14="http://schemas.microsoft.com/office/powerpoint/2010/main" val="1918575525"/>
+      </p:ext>
+    </p:extLst>
+  </p:cSld>
+  <p:clrMapOvr>
+    <a:masterClrMapping/>
+  </p:clrMapOvr>
+</p:sld>
+</file>
+
+<file path=ppt/slides/slide6.xml><?xml version="1.0" encoding="utf-8"?>
+<p:sld xmlns:a="http://schemas.openxmlformats.org/drawingml/2006/main" xmlns:r="http://schemas.openxmlformats.org/officeDocument/2006/relationships" xmlns:p="http://schemas.openxmlformats.org/presentationml/2006/main">
+  <p:cSld>
+    <p:spTree>
+      <p:nvGrpSpPr>
+        <p:cNvPr id="1" name="">
+          <a:extLst>
+            <a:ext uri="{FF2B5EF4-FFF2-40B4-BE49-F238E27FC236}">
+              <a16:creationId xmlns:a16="http://schemas.microsoft.com/office/drawing/2014/main" id="{9765EAF3-C68D-CA0B-E836-10B6D485D62E}"/>
+            </a:ext>
+          </a:extLst>
+        </p:cNvPr>
+        <p:cNvGrpSpPr/>
+        <p:nvPr/>
+      </p:nvGrpSpPr>
+      <p:grpSpPr>
+        <a:xfrm>
+          <a:off x="0" y="0"/>
+          <a:ext cx="0" cy="0"/>
+          <a:chOff x="0" y="0"/>
+          <a:chExt cx="0" cy="0"/>
+        </a:xfrm>
+      </p:grpSpPr>
+      <p:cxnSp>
+        <p:nvCxnSpPr>
+          <p:cNvPr id="16" name="Gerade Verbindung mit Pfeil 15">
+            <a:extLst>
+              <a:ext uri="{FF2B5EF4-FFF2-40B4-BE49-F238E27FC236}">
+                <a16:creationId xmlns:a16="http://schemas.microsoft.com/office/drawing/2014/main" id="{E7F9D7AF-2372-2D5B-9D49-A75620E9BC61}"/>
+              </a:ext>
+            </a:extLst>
+          </p:cNvPr>
+          <p:cNvCxnSpPr>
+            <a:cxnSpLocks/>
+          </p:cNvCxnSpPr>
+          <p:nvPr/>
+        </p:nvCxnSpPr>
+        <p:spPr>
+          <a:xfrm flipV="1">
+            <a:off x="11660848" y="5554272"/>
+            <a:ext cx="414292" cy="1"/>
+          </a:xfrm>
+          <a:prstGeom prst="straightConnector1">
+            <a:avLst/>
+          </a:prstGeom>
+          <a:ln>
+            <a:solidFill>
+              <a:schemeClr val="tx1"/>
+            </a:solidFill>
+            <a:tailEnd type="triangle"/>
+          </a:ln>
+        </p:spPr>
+        <p:style>
+          <a:lnRef idx="2">
+            <a:schemeClr val="accent1"/>
+          </a:lnRef>
+          <a:fillRef idx="0">
+            <a:schemeClr val="accent1"/>
+          </a:fillRef>
+          <a:effectRef idx="1">
+            <a:schemeClr val="accent1"/>
+          </a:effectRef>
+          <a:fontRef idx="minor">
+            <a:schemeClr val="tx1"/>
+          </a:fontRef>
+        </p:style>
+      </p:cxnSp>
+      <p:sp>
+        <p:nvSpPr>
+          <p:cNvPr id="12" name="Textfeld 11">
+            <a:extLst>
+              <a:ext uri="{FF2B5EF4-FFF2-40B4-BE49-F238E27FC236}">
+                <a16:creationId xmlns:a16="http://schemas.microsoft.com/office/drawing/2014/main" id="{8C255C91-EA24-B32B-B1EC-EAEDA997A65E}"/>
+              </a:ext>
+            </a:extLst>
+          </p:cNvPr>
+          <p:cNvSpPr txBox="1"/>
+          <p:nvPr/>
+        </p:nvSpPr>
+        <p:spPr>
+          <a:xfrm>
+            <a:off x="11052138" y="5369606"/>
+            <a:ext cx="546945" cy="369332"/>
+          </a:xfrm>
+          <a:prstGeom prst="rect">
+            <a:avLst/>
+          </a:prstGeom>
+          <a:noFill/>
+        </p:spPr>
+        <p:txBody>
+          <a:bodyPr wrap="none" rtlCol="0">
+            <a:spAutoFit/>
+          </a:bodyPr>
+          <a:lstStyle/>
+          <a:p>
+            <a:r>
+              <a:rPr lang="de-DE" dirty="0" err="1"/>
+              <a:t>use</a:t>
+            </a:r>
+            <a:endParaRPr lang="de-DE" dirty="0"/>
+          </a:p>
+        </p:txBody>
+      </p:sp>
+      <p:sp>
+        <p:nvSpPr>
+          <p:cNvPr id="38" name="Textfeld 37">
+            <a:extLst>
+              <a:ext uri="{FF2B5EF4-FFF2-40B4-BE49-F238E27FC236}">
+                <a16:creationId xmlns:a16="http://schemas.microsoft.com/office/drawing/2014/main" id="{108450A2-08D3-C00E-2B44-32B72DAD43E5}"/>
+              </a:ext>
+            </a:extLst>
+          </p:cNvPr>
+          <p:cNvSpPr txBox="1"/>
+          <p:nvPr/>
+        </p:nvSpPr>
+        <p:spPr>
+          <a:xfrm>
+            <a:off x="153412" y="6364903"/>
+            <a:ext cx="875240" cy="369332"/>
+          </a:xfrm>
+          <a:prstGeom prst="rect">
+            <a:avLst/>
+          </a:prstGeom>
+          <a:noFill/>
+        </p:spPr>
+        <p:txBody>
+          <a:bodyPr wrap="none" rtlCol="0">
+            <a:spAutoFit/>
+          </a:bodyPr>
+          <a:lstStyle/>
+          <a:p>
+            <a:r>
+              <a:rPr lang="de-DE" dirty="0"/>
+              <a:t>Level 3</a:t>
+            </a:r>
+          </a:p>
+        </p:txBody>
+      </p:sp>
+      <p:cxnSp>
+        <p:nvCxnSpPr>
+          <p:cNvPr id="39" name="Gerade Verbindung mit Pfeil 38">
+            <a:extLst>
+              <a:ext uri="{FF2B5EF4-FFF2-40B4-BE49-F238E27FC236}">
+                <a16:creationId xmlns:a16="http://schemas.microsoft.com/office/drawing/2014/main" id="{BEF367A0-8FA0-9462-DB78-9462DCAE55F2}"/>
+              </a:ext>
+            </a:extLst>
+          </p:cNvPr>
+          <p:cNvCxnSpPr>
+            <a:cxnSpLocks/>
+          </p:cNvCxnSpPr>
+          <p:nvPr/>
+        </p:nvCxnSpPr>
+        <p:spPr>
+          <a:xfrm>
+            <a:off x="11660848" y="5943180"/>
+            <a:ext cx="414292" cy="0"/>
+          </a:xfrm>
+          <a:prstGeom prst="straightConnector1">
+            <a:avLst/>
+          </a:prstGeom>
+          <a:ln>
+            <a:prstDash val="sysDash"/>
+            <a:tailEnd type="triangle"/>
+          </a:ln>
+        </p:spPr>
+        <p:style>
+          <a:lnRef idx="2">
+            <a:schemeClr val="accent1"/>
+          </a:lnRef>
+          <a:fillRef idx="0">
+            <a:schemeClr val="accent1"/>
+          </a:fillRef>
+          <a:effectRef idx="1">
+            <a:schemeClr val="accent1"/>
+          </a:effectRef>
+          <a:fontRef idx="minor">
+            <a:schemeClr val="tx1"/>
+          </a:fontRef>
+        </p:style>
+      </p:cxnSp>
+      <p:sp>
+        <p:nvSpPr>
+          <p:cNvPr id="41" name="Textfeld 40">
+            <a:extLst>
+              <a:ext uri="{FF2B5EF4-FFF2-40B4-BE49-F238E27FC236}">
+                <a16:creationId xmlns:a16="http://schemas.microsoft.com/office/drawing/2014/main" id="{8BF258AB-458E-3FE5-A51C-1E144D9DABBF}"/>
+              </a:ext>
+            </a:extLst>
+          </p:cNvPr>
+          <p:cNvSpPr txBox="1"/>
+          <p:nvPr/>
+        </p:nvSpPr>
+        <p:spPr>
+          <a:xfrm>
+            <a:off x="11052138" y="5772805"/>
+            <a:ext cx="351378" cy="369332"/>
+          </a:xfrm>
+          <a:prstGeom prst="rect">
+            <a:avLst/>
+          </a:prstGeom>
+          <a:noFill/>
+        </p:spPr>
+        <p:txBody>
+          <a:bodyPr wrap="none" rtlCol="0">
+            <a:spAutoFit/>
+          </a:bodyPr>
+          <a:lstStyle/>
+          <a:p>
+            <a:r>
+              <a:rPr lang="de-DE" dirty="0" err="1"/>
+              <a:t>is</a:t>
+            </a:r>
+            <a:endParaRPr lang="de-DE" dirty="0"/>
+          </a:p>
+        </p:txBody>
+      </p:sp>
+    </p:spTree>
+    <p:extLst>
+      <p:ext uri="{BB962C8B-B14F-4D97-AF65-F5344CB8AC3E}">
+        <p14:creationId xmlns:p14="http://schemas.microsoft.com/office/powerpoint/2010/main" val="3641553069"/>
       </p:ext>
     </p:extLst>
   </p:cSld>

</xml_diff>